<commit_message>
add  slide , spring,...
</commit_message>
<xml_diff>
--- a/Other/Free/Làm web thật đơn giản với Web Service và Spring.pptx
+++ b/Other/Free/Làm web thật đơn giản với Web Service và Spring.pptx
@@ -11,10 +11,11 @@
     <p:sldId id="265" r:id="rId5"/>
     <p:sldId id="264" r:id="rId6"/>
     <p:sldId id="266" r:id="rId7"/>
-    <p:sldId id="258" r:id="rId8"/>
-    <p:sldId id="261" r:id="rId9"/>
-    <p:sldId id="259" r:id="rId10"/>
-    <p:sldId id="260" r:id="rId11"/>
+    <p:sldId id="267" r:id="rId8"/>
+    <p:sldId id="268" r:id="rId9"/>
+    <p:sldId id="261" r:id="rId10"/>
+    <p:sldId id="259" r:id="rId11"/>
+    <p:sldId id="260" r:id="rId12"/>
   </p:sldIdLst>
   <p:sldSz cx="9144000" cy="6858000" type="screen4x3"/>
   <p:notesSz cx="6858000" cy="9144000"/>
@@ -298,7 +299,7 @@
             <a:fld id="{1D8BD707-D9CF-40AE-B4C6-C98DA3205C09}" type="datetimeFigureOut">
               <a:rPr lang="en-US" smtClean="0"/>
               <a:pPr/>
-              <a:t>6/3/2018</a:t>
+              <a:t>6/4/2018</a:t>
             </a:fld>
             <a:endParaRPr lang="en-US"/>
           </a:p>
@@ -465,7 +466,7 @@
             <a:fld id="{1D8BD707-D9CF-40AE-B4C6-C98DA3205C09}" type="datetimeFigureOut">
               <a:rPr lang="en-US" smtClean="0"/>
               <a:pPr/>
-              <a:t>6/3/2018</a:t>
+              <a:t>6/4/2018</a:t>
             </a:fld>
             <a:endParaRPr lang="en-US"/>
           </a:p>
@@ -642,7 +643,7 @@
             <a:fld id="{1D8BD707-D9CF-40AE-B4C6-C98DA3205C09}" type="datetimeFigureOut">
               <a:rPr lang="en-US" smtClean="0"/>
               <a:pPr/>
-              <a:t>6/3/2018</a:t>
+              <a:t>6/4/2018</a:t>
             </a:fld>
             <a:endParaRPr lang="en-US"/>
           </a:p>
@@ -809,7 +810,7 @@
             <a:fld id="{1D8BD707-D9CF-40AE-B4C6-C98DA3205C09}" type="datetimeFigureOut">
               <a:rPr lang="en-US" smtClean="0"/>
               <a:pPr/>
-              <a:t>6/3/2018</a:t>
+              <a:t>6/4/2018</a:t>
             </a:fld>
             <a:endParaRPr lang="en-US"/>
           </a:p>
@@ -1052,7 +1053,7 @@
             <a:fld id="{1D8BD707-D9CF-40AE-B4C6-C98DA3205C09}" type="datetimeFigureOut">
               <a:rPr lang="en-US" smtClean="0"/>
               <a:pPr/>
-              <a:t>6/3/2018</a:t>
+              <a:t>6/4/2018</a:t>
             </a:fld>
             <a:endParaRPr lang="en-US"/>
           </a:p>
@@ -1337,7 +1338,7 @@
             <a:fld id="{1D8BD707-D9CF-40AE-B4C6-C98DA3205C09}" type="datetimeFigureOut">
               <a:rPr lang="en-US" smtClean="0"/>
               <a:pPr/>
-              <a:t>6/3/2018</a:t>
+              <a:t>6/4/2018</a:t>
             </a:fld>
             <a:endParaRPr lang="en-US"/>
           </a:p>
@@ -1756,7 +1757,7 @@
             <a:fld id="{1D8BD707-D9CF-40AE-B4C6-C98DA3205C09}" type="datetimeFigureOut">
               <a:rPr lang="en-US" smtClean="0"/>
               <a:pPr/>
-              <a:t>6/3/2018</a:t>
+              <a:t>6/4/2018</a:t>
             </a:fld>
             <a:endParaRPr lang="en-US"/>
           </a:p>
@@ -1871,7 +1872,7 @@
             <a:fld id="{1D8BD707-D9CF-40AE-B4C6-C98DA3205C09}" type="datetimeFigureOut">
               <a:rPr lang="en-US" smtClean="0"/>
               <a:pPr/>
-              <a:t>6/3/2018</a:t>
+              <a:t>6/4/2018</a:t>
             </a:fld>
             <a:endParaRPr lang="en-US"/>
           </a:p>
@@ -1963,7 +1964,7 @@
             <a:fld id="{1D8BD707-D9CF-40AE-B4C6-C98DA3205C09}" type="datetimeFigureOut">
               <a:rPr lang="en-US" smtClean="0"/>
               <a:pPr/>
-              <a:t>6/3/2018</a:t>
+              <a:t>6/4/2018</a:t>
             </a:fld>
             <a:endParaRPr lang="en-US"/>
           </a:p>
@@ -2237,7 +2238,7 @@
             <a:fld id="{1D8BD707-D9CF-40AE-B4C6-C98DA3205C09}" type="datetimeFigureOut">
               <a:rPr lang="en-US" smtClean="0"/>
               <a:pPr/>
-              <a:t>6/3/2018</a:t>
+              <a:t>6/4/2018</a:t>
             </a:fld>
             <a:endParaRPr lang="en-US"/>
           </a:p>
@@ -2487,7 +2488,7 @@
             <a:fld id="{1D8BD707-D9CF-40AE-B4C6-C98DA3205C09}" type="datetimeFigureOut">
               <a:rPr lang="en-US" smtClean="0"/>
               <a:pPr/>
-              <a:t>6/3/2018</a:t>
+              <a:t>6/4/2018</a:t>
             </a:fld>
             <a:endParaRPr lang="en-US"/>
           </a:p>
@@ -2697,7 +2698,7 @@
             <a:fld id="{1D8BD707-D9CF-40AE-B4C6-C98DA3205C09}" type="datetimeFigureOut">
               <a:rPr lang="en-US" smtClean="0"/>
               <a:pPr/>
-              <a:t>6/3/2018</a:t>
+              <a:t>6/4/2018</a:t>
             </a:fld>
             <a:endParaRPr lang="en-US"/>
           </a:p>
@@ -3211,6 +3212,507 @@
           <a:bodyPr/>
           <a:lstStyle/>
           <a:p>
+            <a:r>
+              <a:rPr lang="en-US" dirty="0" err="1" smtClean="0"/>
+              <a:t>Đặt</a:t>
+            </a:r>
+            <a:r>
+              <a:rPr lang="en-US" dirty="0" smtClean="0"/>
+              <a:t> </a:t>
+            </a:r>
+            <a:r>
+              <a:rPr lang="en-US" dirty="0" err="1" smtClean="0"/>
+              <a:t>vấn</a:t>
+            </a:r>
+            <a:r>
+              <a:rPr lang="en-US" dirty="0" smtClean="0"/>
+              <a:t> </a:t>
+            </a:r>
+            <a:r>
+              <a:rPr lang="en-US" dirty="0" err="1" smtClean="0"/>
+              <a:t>đề</a:t>
+            </a:r>
+            <a:endParaRPr lang="en-US" dirty="0"/>
+          </a:p>
+        </p:txBody>
+      </p:sp>
+      <p:pic>
+        <p:nvPicPr>
+          <p:cNvPr id="2050" name="Picture 2" descr="Image result for pc"/>
+          <p:cNvPicPr>
+            <a:picLocks noChangeAspect="1" noChangeArrowheads="1"/>
+          </p:cNvPicPr>
+          <p:nvPr/>
+        </p:nvPicPr>
+        <p:blipFill>
+          <a:blip r:embed="rId2" cstate="print">
+            <a:extLst>
+              <a:ext uri="{28A0092B-C50C-407E-A947-70E740481C1C}">
+                <a14:useLocalDpi xmlns:a14="http://schemas.microsoft.com/office/drawing/2010/main" val="0"/>
+              </a:ext>
+            </a:extLst>
+          </a:blip>
+          <a:srcRect/>
+          <a:stretch>
+            <a:fillRect/>
+          </a:stretch>
+        </p:blipFill>
+        <p:spPr bwMode="auto">
+          <a:xfrm>
+            <a:off x="533400" y="1905000"/>
+            <a:ext cx="2283475" cy="1713602"/>
+          </a:xfrm>
+          <a:prstGeom prst="rect">
+            <a:avLst/>
+          </a:prstGeom>
+          <a:extLst/>
+        </p:spPr>
+        <p:style>
+          <a:lnRef idx="2">
+            <a:schemeClr val="accent1"/>
+          </a:lnRef>
+          <a:fillRef idx="1">
+            <a:schemeClr val="lt1"/>
+          </a:fillRef>
+          <a:effectRef idx="0">
+            <a:schemeClr val="accent1"/>
+          </a:effectRef>
+          <a:fontRef idx="minor">
+            <a:schemeClr val="dk1"/>
+          </a:fontRef>
+        </p:style>
+      </p:pic>
+      <p:pic>
+        <p:nvPicPr>
+          <p:cNvPr id="2052" name="Picture 4" descr="Image result for cloud internet"/>
+          <p:cNvPicPr>
+            <a:picLocks noChangeAspect="1" noChangeArrowheads="1"/>
+          </p:cNvPicPr>
+          <p:nvPr/>
+        </p:nvPicPr>
+        <p:blipFill>
+          <a:blip r:embed="rId3" cstate="print">
+            <a:extLst>
+              <a:ext uri="{28A0092B-C50C-407E-A947-70E740481C1C}">
+                <a14:useLocalDpi xmlns:a14="http://schemas.microsoft.com/office/drawing/2010/main" val="0"/>
+              </a:ext>
+            </a:extLst>
+          </a:blip>
+          <a:srcRect/>
+          <a:stretch>
+            <a:fillRect/>
+          </a:stretch>
+        </p:blipFill>
+        <p:spPr bwMode="auto">
+          <a:xfrm>
+            <a:off x="4038600" y="2085758"/>
+            <a:ext cx="1544267" cy="1209676"/>
+          </a:xfrm>
+          <a:prstGeom prst="rect">
+            <a:avLst/>
+          </a:prstGeom>
+          <a:noFill/>
+          <a:extLst>
+            <a:ext uri="{909E8E84-426E-40DD-AFC4-6F175D3DCCD1}">
+              <a14:hiddenFill xmlns:a14="http://schemas.microsoft.com/office/drawing/2010/main">
+                <a:solidFill>
+                  <a:srgbClr val="FFFFFF"/>
+                </a:solidFill>
+              </a14:hiddenFill>
+            </a:ext>
+          </a:extLst>
+        </p:spPr>
+      </p:pic>
+      <p:sp>
+        <p:nvSpPr>
+          <p:cNvPr id="3" name="Right Arrow 2"/>
+          <p:cNvSpPr/>
+          <p:nvPr/>
+        </p:nvSpPr>
+        <p:spPr>
+          <a:xfrm>
+            <a:off x="3048000" y="2338387"/>
+            <a:ext cx="916925" cy="318639"/>
+          </a:xfrm>
+          <a:prstGeom prst="rightArrow">
+            <a:avLst/>
+          </a:prstGeom>
+        </p:spPr>
+        <p:style>
+          <a:lnRef idx="2">
+            <a:schemeClr val="accent1">
+              <a:shade val="50000"/>
+            </a:schemeClr>
+          </a:lnRef>
+          <a:fillRef idx="1">
+            <a:schemeClr val="accent1"/>
+          </a:fillRef>
+          <a:effectRef idx="0">
+            <a:schemeClr val="accent1"/>
+          </a:effectRef>
+          <a:fontRef idx="minor">
+            <a:schemeClr val="lt1"/>
+          </a:fontRef>
+        </p:style>
+        <p:txBody>
+          <a:bodyPr rtlCol="0" anchor="ctr"/>
+          <a:lstStyle/>
+          <a:p>
+            <a:pPr algn="ctr"/>
+            <a:endParaRPr lang="en-US"/>
+          </a:p>
+        </p:txBody>
+      </p:sp>
+      <p:sp>
+        <p:nvSpPr>
+          <p:cNvPr id="7" name="Right Arrow 6"/>
+          <p:cNvSpPr/>
+          <p:nvPr/>
+        </p:nvSpPr>
+        <p:spPr>
+          <a:xfrm>
+            <a:off x="5582867" y="2338388"/>
+            <a:ext cx="916925" cy="318639"/>
+          </a:xfrm>
+          <a:prstGeom prst="rightArrow">
+            <a:avLst/>
+          </a:prstGeom>
+        </p:spPr>
+        <p:style>
+          <a:lnRef idx="2">
+            <a:schemeClr val="accent1">
+              <a:shade val="50000"/>
+            </a:schemeClr>
+          </a:lnRef>
+          <a:fillRef idx="1">
+            <a:schemeClr val="accent1"/>
+          </a:fillRef>
+          <a:effectRef idx="0">
+            <a:schemeClr val="accent1"/>
+          </a:effectRef>
+          <a:fontRef idx="minor">
+            <a:schemeClr val="lt1"/>
+          </a:fontRef>
+        </p:style>
+        <p:txBody>
+          <a:bodyPr rtlCol="0" anchor="ctr"/>
+          <a:lstStyle/>
+          <a:p>
+            <a:pPr algn="ctr"/>
+            <a:endParaRPr lang="en-US"/>
+          </a:p>
+        </p:txBody>
+      </p:sp>
+      <p:sp>
+        <p:nvSpPr>
+          <p:cNvPr id="9" name="Right Arrow 8"/>
+          <p:cNvSpPr/>
+          <p:nvPr/>
+        </p:nvSpPr>
+        <p:spPr>
+          <a:xfrm rot="10800000">
+            <a:off x="3048000" y="2857862"/>
+            <a:ext cx="916925" cy="318639"/>
+          </a:xfrm>
+          <a:prstGeom prst="rightArrow">
+            <a:avLst/>
+          </a:prstGeom>
+        </p:spPr>
+        <p:style>
+          <a:lnRef idx="2">
+            <a:schemeClr val="accent1">
+              <a:shade val="50000"/>
+            </a:schemeClr>
+          </a:lnRef>
+          <a:fillRef idx="1">
+            <a:schemeClr val="accent1"/>
+          </a:fillRef>
+          <a:effectRef idx="0">
+            <a:schemeClr val="accent1"/>
+          </a:effectRef>
+          <a:fontRef idx="minor">
+            <a:schemeClr val="lt1"/>
+          </a:fontRef>
+        </p:style>
+        <p:txBody>
+          <a:bodyPr rtlCol="0" anchor="ctr"/>
+          <a:lstStyle/>
+          <a:p>
+            <a:pPr algn="ctr"/>
+            <a:endParaRPr lang="en-US"/>
+          </a:p>
+        </p:txBody>
+      </p:sp>
+      <p:sp>
+        <p:nvSpPr>
+          <p:cNvPr id="10" name="Right Arrow 9"/>
+          <p:cNvSpPr/>
+          <p:nvPr/>
+        </p:nvSpPr>
+        <p:spPr>
+          <a:xfrm rot="10800000">
+            <a:off x="5595567" y="2846060"/>
+            <a:ext cx="916925" cy="318639"/>
+          </a:xfrm>
+          <a:prstGeom prst="rightArrow">
+            <a:avLst/>
+          </a:prstGeom>
+        </p:spPr>
+        <p:style>
+          <a:lnRef idx="2">
+            <a:schemeClr val="accent1">
+              <a:shade val="50000"/>
+            </a:schemeClr>
+          </a:lnRef>
+          <a:fillRef idx="1">
+            <a:schemeClr val="accent1"/>
+          </a:fillRef>
+          <a:effectRef idx="0">
+            <a:schemeClr val="accent1"/>
+          </a:effectRef>
+          <a:fontRef idx="minor">
+            <a:schemeClr val="lt1"/>
+          </a:fontRef>
+        </p:style>
+        <p:txBody>
+          <a:bodyPr rtlCol="0" anchor="ctr"/>
+          <a:lstStyle/>
+          <a:p>
+            <a:pPr algn="ctr"/>
+            <a:endParaRPr lang="en-US"/>
+          </a:p>
+        </p:txBody>
+      </p:sp>
+      <p:pic>
+        <p:nvPicPr>
+          <p:cNvPr id="12" name="Picture 6" descr="https://scontent.fhan5-5.fna.fbcdn.net/v/t1.15752-9/34321862_1243292122473760_5429512198915358720_n.png?_nc_cat=0&amp;oh=df88a9b28bf6a41448b15961b01966e1&amp;oe=5B82613D"/>
+          <p:cNvPicPr>
+            <a:picLocks noChangeAspect="1" noChangeArrowheads="1"/>
+          </p:cNvPicPr>
+          <p:nvPr/>
+        </p:nvPicPr>
+        <p:blipFill>
+          <a:blip r:embed="rId4" cstate="print">
+            <a:extLst>
+              <a:ext uri="{28A0092B-C50C-407E-A947-70E740481C1C}">
+                <a14:useLocalDpi xmlns:a14="http://schemas.microsoft.com/office/drawing/2010/main" val="0"/>
+              </a:ext>
+            </a:extLst>
+          </a:blip>
+          <a:srcRect/>
+          <a:stretch>
+            <a:fillRect/>
+          </a:stretch>
+        </p:blipFill>
+        <p:spPr bwMode="auto">
+          <a:xfrm>
+            <a:off x="1607708" y="2529993"/>
+            <a:ext cx="1016936" cy="1807886"/>
+          </a:xfrm>
+          <a:prstGeom prst="rect">
+            <a:avLst/>
+          </a:prstGeom>
+          <a:noFill/>
+          <a:extLst>
+            <a:ext uri="{909E8E84-426E-40DD-AFC4-6F175D3DCCD1}">
+              <a14:hiddenFill xmlns:a14="http://schemas.microsoft.com/office/drawing/2010/main">
+                <a:solidFill>
+                  <a:srgbClr val="FFFFFF"/>
+                </a:solidFill>
+              </a14:hiddenFill>
+            </a:ext>
+          </a:extLst>
+        </p:spPr>
+      </p:pic>
+      <p:sp>
+        <p:nvSpPr>
+          <p:cNvPr id="6" name="TextBox 5"/>
+          <p:cNvSpPr txBox="1"/>
+          <p:nvPr/>
+        </p:nvSpPr>
+        <p:spPr>
+          <a:xfrm>
+            <a:off x="4083550" y="1604038"/>
+            <a:ext cx="1512017" cy="369332"/>
+          </a:xfrm>
+          <a:prstGeom prst="rect">
+            <a:avLst/>
+          </a:prstGeom>
+        </p:spPr>
+        <p:style>
+          <a:lnRef idx="2">
+            <a:schemeClr val="accent3"/>
+          </a:lnRef>
+          <a:fillRef idx="1">
+            <a:schemeClr val="lt1"/>
+          </a:fillRef>
+          <a:effectRef idx="0">
+            <a:schemeClr val="accent3"/>
+          </a:effectRef>
+          <a:fontRef idx="minor">
+            <a:schemeClr val="dk1"/>
+          </a:fontRef>
+        </p:style>
+        <p:txBody>
+          <a:bodyPr wrap="none" rtlCol="0">
+            <a:spAutoFit/>
+          </a:bodyPr>
+          <a:lstStyle/>
+          <a:p>
+            <a:r>
+              <a:rPr lang="en-US" dirty="0" smtClean="0"/>
+              <a:t>HTTP Protocol</a:t>
+            </a:r>
+            <a:endParaRPr lang="en-US" dirty="0"/>
+          </a:p>
+        </p:txBody>
+      </p:sp>
+      <p:pic>
+        <p:nvPicPr>
+          <p:cNvPr id="1026" name="Picture 2" descr="Image result for database"/>
+          <p:cNvPicPr>
+            <a:picLocks noChangeAspect="1" noChangeArrowheads="1"/>
+          </p:cNvPicPr>
+          <p:nvPr/>
+        </p:nvPicPr>
+        <p:blipFill>
+          <a:blip r:embed="rId5">
+            <a:extLst>
+              <a:ext uri="{28A0092B-C50C-407E-A947-70E740481C1C}">
+                <a14:useLocalDpi xmlns:a14="http://schemas.microsoft.com/office/drawing/2010/main" val="0"/>
+              </a:ext>
+            </a:extLst>
+          </a:blip>
+          <a:srcRect/>
+          <a:stretch>
+            <a:fillRect/>
+          </a:stretch>
+        </p:blipFill>
+        <p:spPr bwMode="auto">
+          <a:xfrm>
+            <a:off x="6512492" y="1738096"/>
+            <a:ext cx="1905000" cy="1905000"/>
+          </a:xfrm>
+          <a:prstGeom prst="rect">
+            <a:avLst/>
+          </a:prstGeom>
+          <a:noFill/>
+          <a:extLst>
+            <a:ext uri="{909E8E84-426E-40DD-AFC4-6F175D3DCCD1}">
+              <a14:hiddenFill xmlns:a14="http://schemas.microsoft.com/office/drawing/2010/main">
+                <a:solidFill>
+                  <a:srgbClr val="FFFFFF"/>
+                </a:solidFill>
+              </a14:hiddenFill>
+            </a:ext>
+          </a:extLst>
+        </p:spPr>
+      </p:pic>
+      <p:sp>
+        <p:nvSpPr>
+          <p:cNvPr id="8" name="TextBox 7"/>
+          <p:cNvSpPr txBox="1"/>
+          <p:nvPr/>
+        </p:nvSpPr>
+        <p:spPr>
+          <a:xfrm>
+            <a:off x="5667896" y="3176502"/>
+            <a:ext cx="1107508" cy="369332"/>
+          </a:xfrm>
+          <a:prstGeom prst="rect">
+            <a:avLst/>
+          </a:prstGeom>
+          <a:noFill/>
+        </p:spPr>
+        <p:txBody>
+          <a:bodyPr wrap="square" rtlCol="0">
+            <a:spAutoFit/>
+          </a:bodyPr>
+          <a:lstStyle/>
+          <a:p>
+            <a:r>
+              <a:rPr lang="en-US" dirty="0" smtClean="0"/>
+              <a:t>DATA</a:t>
+            </a:r>
+            <a:endParaRPr lang="en-US" dirty="0"/>
+          </a:p>
+        </p:txBody>
+      </p:sp>
+      <p:sp>
+        <p:nvSpPr>
+          <p:cNvPr id="16" name="TextBox 15"/>
+          <p:cNvSpPr txBox="1"/>
+          <p:nvPr/>
+        </p:nvSpPr>
+        <p:spPr>
+          <a:xfrm>
+            <a:off x="3200400" y="3249270"/>
+            <a:ext cx="1107508" cy="369332"/>
+          </a:xfrm>
+          <a:prstGeom prst="rect">
+            <a:avLst/>
+          </a:prstGeom>
+          <a:noFill/>
+        </p:spPr>
+        <p:txBody>
+          <a:bodyPr wrap="square" rtlCol="0">
+            <a:spAutoFit/>
+          </a:bodyPr>
+          <a:lstStyle/>
+          <a:p>
+            <a:r>
+              <a:rPr lang="en-US" dirty="0" smtClean="0"/>
+              <a:t>DATA</a:t>
+            </a:r>
+            <a:endParaRPr lang="en-US" dirty="0"/>
+          </a:p>
+        </p:txBody>
+      </p:sp>
+    </p:spTree>
+    <p:extLst>
+      <p:ext uri="{BB962C8B-B14F-4D97-AF65-F5344CB8AC3E}">
+        <p14:creationId xmlns:p14="http://schemas.microsoft.com/office/powerpoint/2010/main" val="1709627152"/>
+      </p:ext>
+    </p:extLst>
+  </p:cSld>
+  <p:clrMapOvr>
+    <a:masterClrMapping/>
+  </p:clrMapOvr>
+</p:sld>
+</file>
+
+<file path=ppt/slides/slide11.xml><?xml version="1.0" encoding="utf-8"?>
+<p:sld xmlns:a="http://schemas.openxmlformats.org/drawingml/2006/main" xmlns:r="http://schemas.openxmlformats.org/officeDocument/2006/relationships" xmlns:p="http://schemas.openxmlformats.org/presentationml/2006/main">
+  <p:cSld>
+    <p:spTree>
+      <p:nvGrpSpPr>
+        <p:cNvPr id="1" name=""/>
+        <p:cNvGrpSpPr/>
+        <p:nvPr/>
+      </p:nvGrpSpPr>
+      <p:grpSpPr>
+        <a:xfrm>
+          <a:off x="0" y="0"/>
+          <a:ext cx="0" cy="0"/>
+          <a:chOff x="0" y="0"/>
+          <a:chExt cx="0" cy="0"/>
+        </a:xfrm>
+      </p:grpSpPr>
+      <p:sp>
+        <p:nvSpPr>
+          <p:cNvPr id="2" name="Title 1"/>
+          <p:cNvSpPr>
+            <a:spLocks noGrp="1"/>
+          </p:cNvSpPr>
+          <p:nvPr>
+            <p:ph type="title"/>
+          </p:nvPr>
+        </p:nvSpPr>
+        <p:spPr/>
+        <p:txBody>
+          <a:bodyPr/>
+          <a:lstStyle/>
+          <a:p>
             <a:endParaRPr lang="en-US" dirty="0"/>
           </a:p>
         </p:txBody>
@@ -4295,8 +4797,8 @@
         </p:blipFill>
         <p:spPr bwMode="auto">
           <a:xfrm>
-            <a:off x="6400800" y="2574498"/>
-            <a:ext cx="2493922" cy="2090738"/>
+            <a:off x="6248400" y="2574497"/>
+            <a:ext cx="2667000" cy="2235835"/>
           </a:xfrm>
           <a:prstGeom prst="rect">
             <a:avLst/>
@@ -4469,12 +4971,67 @@
           <a:lstStyle/>
           <a:p>
             <a:r>
+              <a:rPr lang="en-US" dirty="0" err="1" smtClean="0"/>
+              <a:t>Từ</a:t>
+            </a:r>
+            <a:r>
+              <a:rPr lang="en-US" dirty="0" smtClean="0"/>
+              <a:t> </a:t>
+            </a:r>
+            <a:r>
+              <a:rPr lang="en-US" dirty="0" err="1" smtClean="0"/>
+              <a:t>Cục</a:t>
+            </a:r>
+            <a:r>
+              <a:rPr lang="en-US" dirty="0" smtClean="0"/>
+              <a:t> </a:t>
+            </a:r>
+            <a:r>
+              <a:rPr lang="en-US" dirty="0" err="1" smtClean="0"/>
+              <a:t>khí</a:t>
+            </a:r>
+            <a:r>
+              <a:rPr lang="en-US" dirty="0" smtClean="0"/>
+              <a:t> </a:t>
+            </a:r>
+            <a:r>
+              <a:rPr lang="en-US" dirty="0" err="1" smtClean="0"/>
+              <a:t>tượng</a:t>
+            </a:r>
+            <a:r>
+              <a:rPr lang="en-US" dirty="0" smtClean="0"/>
+              <a:t> </a:t>
+            </a:r>
+            <a:r>
+              <a:rPr lang="en-US" dirty="0" err="1" smtClean="0"/>
+              <a:t>thủy</a:t>
+            </a:r>
+            <a:r>
+              <a:rPr lang="en-US" dirty="0" smtClean="0"/>
+              <a:t> </a:t>
+            </a:r>
+            <a:r>
+              <a:rPr lang="en-US" dirty="0" err="1" smtClean="0"/>
+              <a:t>văn</a:t>
+            </a:r>
+            <a:endParaRPr lang="en-US" dirty="0" smtClean="0"/>
+          </a:p>
+          <a:p>
+            <a:r>
+              <a:rPr lang="en-US" dirty="0" err="1" smtClean="0"/>
+              <a:t>Từ</a:t>
+            </a:r>
+            <a:r>
+              <a:rPr lang="en-US" dirty="0" smtClean="0"/>
+              <a:t> </a:t>
+            </a:r>
+            <a:r>
               <a:rPr lang="en-US" dirty="0" err="1"/>
-              <a:t>C</a:t>
-            </a:r>
-            <a:r>
-              <a:rPr lang="en-US" dirty="0" err="1" smtClean="0"/>
-              <a:t>ục</a:t>
+              <a:t>c</a:t>
+            </a:r>
+            <a:r>
+              <a:rPr lang="en-US" dirty="0" err="1" smtClean="0"/>
+              <a:t>ác</a:t>
             </a:r>
             <a:r>
               <a:rPr lang="en-US" dirty="0" smtClean="0"/>
@@ -4482,7 +5039,7 @@
             </a:r>
             <a:r>
               <a:rPr lang="en-US" dirty="0" err="1" smtClean="0"/>
-              <a:t>khí</a:t>
+              <a:t>kênh</a:t>
             </a:r>
             <a:r>
               <a:rPr lang="en-US" dirty="0" smtClean="0"/>
@@ -4490,7 +5047,7 @@
             </a:r>
             <a:r>
               <a:rPr lang="en-US" dirty="0" err="1" smtClean="0"/>
-              <a:t>tượng</a:t>
+              <a:t>thời</a:t>
             </a:r>
             <a:r>
               <a:rPr lang="en-US" dirty="0" smtClean="0"/>
@@ -4498,60 +5055,26 @@
             </a:r>
             <a:r>
               <a:rPr lang="en-US" dirty="0" err="1" smtClean="0"/>
-              <a:t>thủy</a:t>
+              <a:t>tiết</a:t>
+            </a:r>
+            <a:endParaRPr lang="en-US" dirty="0" smtClean="0"/>
+          </a:p>
+          <a:p>
+            <a:r>
+              <a:rPr lang="en-US" dirty="0" err="1" smtClean="0"/>
+              <a:t>Từ</a:t>
             </a:r>
             <a:r>
               <a:rPr lang="en-US" dirty="0" smtClean="0"/>
               <a:t> </a:t>
             </a:r>
             <a:r>
-              <a:rPr lang="en-US" dirty="0" err="1" smtClean="0"/>
-              <a:t>văn</a:t>
-            </a:r>
-            <a:r>
-              <a:rPr lang="en-US" dirty="0" smtClean="0"/>
-              <a:t> TW</a:t>
-            </a:r>
-          </a:p>
-          <a:p>
-            <a:r>
               <a:rPr lang="en-US" dirty="0" err="1"/>
-              <a:t>C</a:t>
+              <a:t>c</a:t>
             </a:r>
             <a:r>
               <a:rPr lang="en-US" dirty="0" err="1" smtClean="0"/>
               <a:t>ác</a:t>
-            </a:r>
-            <a:r>
-              <a:rPr lang="en-US" dirty="0" smtClean="0"/>
-              <a:t> </a:t>
-            </a:r>
-            <a:r>
-              <a:rPr lang="en-US" dirty="0" err="1" smtClean="0"/>
-              <a:t>kênh</a:t>
-            </a:r>
-            <a:r>
-              <a:rPr lang="en-US" dirty="0" smtClean="0"/>
-              <a:t> </a:t>
-            </a:r>
-            <a:r>
-              <a:rPr lang="en-US" dirty="0" err="1" smtClean="0"/>
-              <a:t>thời</a:t>
-            </a:r>
-            <a:r>
-              <a:rPr lang="en-US" dirty="0" smtClean="0"/>
-              <a:t> </a:t>
-            </a:r>
-            <a:r>
-              <a:rPr lang="en-US" dirty="0" err="1" smtClean="0"/>
-              <a:t>tiết</a:t>
-            </a:r>
-            <a:endParaRPr lang="en-US" dirty="0" smtClean="0"/>
-          </a:p>
-          <a:p>
-            <a:r>
-              <a:rPr lang="en-US" dirty="0" err="1" smtClean="0"/>
-              <a:t>Các</a:t>
             </a:r>
             <a:r>
               <a:rPr lang="en-US" dirty="0" smtClean="0"/>
@@ -4604,7 +5127,7 @@
         </p:blipFill>
         <p:spPr bwMode="auto">
           <a:xfrm>
-            <a:off x="5581650" y="3886200"/>
+            <a:off x="914400" y="3721100"/>
             <a:ext cx="2819399" cy="2819400"/>
           </a:xfrm>
           <a:prstGeom prst="rect">
@@ -4622,6 +5145,94 @@
           </a:extLst>
         </p:spPr>
       </p:pic>
+      <p:sp>
+        <p:nvSpPr>
+          <p:cNvPr id="4" name="Oval 3"/>
+          <p:cNvSpPr/>
+          <p:nvPr/>
+        </p:nvSpPr>
+        <p:spPr>
+          <a:xfrm>
+            <a:off x="5486400" y="4419600"/>
+            <a:ext cx="2362200" cy="1981200"/>
+          </a:xfrm>
+          <a:prstGeom prst="ellipse">
+            <a:avLst/>
+          </a:prstGeom>
+        </p:spPr>
+        <p:style>
+          <a:lnRef idx="2">
+            <a:schemeClr val="accent1">
+              <a:shade val="50000"/>
+            </a:schemeClr>
+          </a:lnRef>
+          <a:fillRef idx="1">
+            <a:schemeClr val="accent1"/>
+          </a:fillRef>
+          <a:effectRef idx="0">
+            <a:schemeClr val="accent1"/>
+          </a:effectRef>
+          <a:fontRef idx="minor">
+            <a:schemeClr val="lt1"/>
+          </a:fontRef>
+        </p:style>
+        <p:txBody>
+          <a:bodyPr rtlCol="0" anchor="ctr"/>
+          <a:lstStyle/>
+          <a:p>
+            <a:pPr algn="ctr"/>
+            <a:r>
+              <a:rPr lang="en-US" sz="2800" dirty="0" smtClean="0"/>
+              <a:t>OTHER</a:t>
+            </a:r>
+            <a:endParaRPr lang="en-GB" sz="2800" dirty="0"/>
+          </a:p>
+        </p:txBody>
+      </p:sp>
+      <p:sp>
+        <p:nvSpPr>
+          <p:cNvPr id="6" name="Left Arrow 5"/>
+          <p:cNvSpPr/>
+          <p:nvPr/>
+        </p:nvSpPr>
+        <p:spPr>
+          <a:xfrm>
+            <a:off x="3390900" y="4718050"/>
+            <a:ext cx="1981200" cy="1384300"/>
+          </a:xfrm>
+          <a:prstGeom prst="leftArrow">
+            <a:avLst/>
+          </a:prstGeom>
+        </p:spPr>
+        <p:style>
+          <a:lnRef idx="2">
+            <a:schemeClr val="accent1">
+              <a:shade val="50000"/>
+            </a:schemeClr>
+          </a:lnRef>
+          <a:fillRef idx="1">
+            <a:schemeClr val="accent1"/>
+          </a:fillRef>
+          <a:effectRef idx="0">
+            <a:schemeClr val="accent1"/>
+          </a:effectRef>
+          <a:fontRef idx="minor">
+            <a:schemeClr val="lt1"/>
+          </a:fontRef>
+        </p:style>
+        <p:txBody>
+          <a:bodyPr rtlCol="0" anchor="ctr"/>
+          <a:lstStyle/>
+          <a:p>
+            <a:pPr algn="ctr"/>
+            <a:r>
+              <a:rPr lang="en-US" dirty="0" smtClean="0"/>
+              <a:t>DATA</a:t>
+            </a:r>
+            <a:endParaRPr lang="en-GB" dirty="0"/>
+          </a:p>
+        </p:txBody>
+      </p:sp>
     </p:spTree>
     <p:extLst>
       <p:ext uri="{BB962C8B-B14F-4D97-AF65-F5344CB8AC3E}">
@@ -4669,303 +5280,133 @@
             <p:ph type="title"/>
           </p:nvPr>
         </p:nvSpPr>
-        <p:spPr>
+        <p:spPr/>
+        <p:txBody>
+          <a:bodyPr/>
+          <a:lstStyle/>
+          <a:p>
+            <a:r>
+              <a:rPr lang="en-US" dirty="0" err="1" smtClean="0"/>
+              <a:t>AccuWeather</a:t>
+            </a:r>
+            <a:r>
+              <a:rPr lang="en-US" dirty="0" smtClean="0"/>
+              <a:t> API</a:t>
+            </a:r>
+            <a:endParaRPr lang="en-GB" dirty="0"/>
+          </a:p>
+        </p:txBody>
+      </p:sp>
+      <p:sp>
+        <p:nvSpPr>
+          <p:cNvPr id="3" name="Content Placeholder 2"/>
+          <p:cNvSpPr>
+            <a:spLocks noGrp="1"/>
+          </p:cNvSpPr>
+          <p:nvPr>
+            <p:ph idx="1"/>
+          </p:nvPr>
+        </p:nvSpPr>
+        <p:spPr/>
+        <p:txBody>
+          <a:bodyPr/>
+          <a:lstStyle/>
+          <a:p>
+            <a:r>
+              <a:rPr lang="en-US" dirty="0" err="1" smtClean="0"/>
+              <a:t>Cung</a:t>
+            </a:r>
+            <a:r>
+              <a:rPr lang="en-US" dirty="0" smtClean="0"/>
+              <a:t> </a:t>
+            </a:r>
+            <a:r>
+              <a:rPr lang="en-US" dirty="0" err="1" smtClean="0"/>
+              <a:t>cấp</a:t>
+            </a:r>
+            <a:r>
+              <a:rPr lang="en-US" dirty="0" smtClean="0"/>
+              <a:t> URL</a:t>
+            </a:r>
+          </a:p>
+          <a:p>
+            <a:r>
+              <a:rPr lang="en-US" dirty="0" err="1" smtClean="0"/>
+              <a:t>Trong</a:t>
+            </a:r>
+            <a:r>
+              <a:rPr lang="en-US" dirty="0" smtClean="0"/>
+              <a:t> URL </a:t>
+            </a:r>
+            <a:r>
+              <a:rPr lang="en-US" dirty="0" err="1" smtClean="0"/>
+              <a:t>chứa</a:t>
+            </a:r>
+            <a:r>
+              <a:rPr lang="en-US" dirty="0" smtClean="0"/>
+              <a:t> </a:t>
+            </a:r>
+            <a:r>
+              <a:rPr lang="en-US" dirty="0" err="1" smtClean="0"/>
+              <a:t>thông</a:t>
+            </a:r>
+            <a:r>
+              <a:rPr lang="en-US" dirty="0" smtClean="0"/>
+              <a:t> tin</a:t>
+            </a:r>
+            <a:endParaRPr lang="en-GB" dirty="0"/>
+          </a:p>
+        </p:txBody>
+      </p:sp>
+      <p:sp>
+        <p:nvSpPr>
+          <p:cNvPr id="4" name="AutoShape 2" descr="Image result for C#"/>
+          <p:cNvSpPr>
+            <a:spLocks noChangeAspect="1" noChangeArrowheads="1"/>
+          </p:cNvSpPr>
+          <p:nvPr/>
+        </p:nvSpPr>
+        <p:spPr bwMode="auto">
           <a:xfrm>
-            <a:off x="457200" y="27709"/>
-            <a:ext cx="8229600" cy="1143000"/>
-          </a:xfrm>
-        </p:spPr>
-        <p:txBody>
-          <a:bodyPr/>
-          <a:lstStyle/>
-          <a:p>
-            <a:r>
-              <a:rPr lang="en-US" smtClean="0"/>
-              <a:t>Vấn đề 1</a:t>
-            </a:r>
-            <a:endParaRPr lang="en-US" dirty="0"/>
-          </a:p>
-        </p:txBody>
-      </p:sp>
-      <p:sp>
-        <p:nvSpPr>
-          <p:cNvPr id="5" name="TextBox 4"/>
-          <p:cNvSpPr txBox="1"/>
-          <p:nvPr/>
-        </p:nvSpPr>
-        <p:spPr>
-          <a:xfrm>
-            <a:off x="698290" y="5753100"/>
-            <a:ext cx="8218917" cy="523220"/>
+            <a:off x="155575" y="-144463"/>
+            <a:ext cx="304800" cy="304801"/>
           </a:xfrm>
           <a:prstGeom prst="rect">
             <a:avLst/>
           </a:prstGeom>
-        </p:spPr>
-        <p:style>
-          <a:lnRef idx="2">
-            <a:schemeClr val="accent3"/>
-          </a:lnRef>
-          <a:fillRef idx="1">
-            <a:schemeClr val="lt1"/>
-          </a:fillRef>
-          <a:effectRef idx="0">
-            <a:schemeClr val="accent3"/>
-          </a:effectRef>
-          <a:fontRef idx="minor">
-            <a:schemeClr val="dk1"/>
-          </a:fontRef>
-        </p:style>
-        <p:txBody>
-          <a:bodyPr wrap="none" rtlCol="0">
-            <a:spAutoFit/>
+          <a:noFill/>
+          <a:extLst>
+            <a:ext uri="{909E8E84-426E-40DD-AFC4-6F175D3DCCD1}">
+              <a14:hiddenFill xmlns:a14="http://schemas.microsoft.com/office/drawing/2010/main">
+                <a:solidFill>
+                  <a:srgbClr val="FFFFFF"/>
+                </a:solidFill>
+              </a14:hiddenFill>
+            </a:ext>
+          </a:extLst>
+        </p:spPr>
+        <p:txBody>
+          <a:bodyPr vert="horz" wrap="square" lIns="91440" tIns="45720" rIns="91440" bIns="45720" numCol="1" anchor="t" anchorCtr="0" compatLnSpc="1">
+            <a:prstTxWarp prst="textNoShape">
+              <a:avLst/>
+            </a:prstTxWarp>
           </a:bodyPr>
           <a:lstStyle/>
           <a:p>
-            <a:r>
-              <a:rPr lang="en-US" sz="2800" dirty="0" err="1" smtClean="0"/>
-              <a:t>Muốn</a:t>
-            </a:r>
-            <a:r>
-              <a:rPr lang="en-US" sz="2800" dirty="0" smtClean="0"/>
-              <a:t> </a:t>
-            </a:r>
-            <a:r>
-              <a:rPr lang="en-US" sz="2800" dirty="0" err="1" smtClean="0"/>
-              <a:t>có</a:t>
-            </a:r>
-            <a:r>
-              <a:rPr lang="en-US" sz="2800" dirty="0" smtClean="0"/>
-              <a:t> Mobile App </a:t>
-            </a:r>
-            <a:r>
-              <a:rPr lang="en-US" sz="2800" dirty="0" err="1" smtClean="0"/>
-              <a:t>và</a:t>
-            </a:r>
-            <a:r>
-              <a:rPr lang="en-US" sz="2800" dirty="0" smtClean="0"/>
-              <a:t> Website </a:t>
-            </a:r>
-            <a:r>
-              <a:rPr lang="en-US" sz="2800" dirty="0" err="1" smtClean="0"/>
-              <a:t>sử</a:t>
-            </a:r>
-            <a:r>
-              <a:rPr lang="en-US" sz="2800" dirty="0" smtClean="0"/>
-              <a:t> </a:t>
-            </a:r>
-            <a:r>
-              <a:rPr lang="en-US" sz="2800" dirty="0" err="1" smtClean="0"/>
-              <a:t>dụng</a:t>
-            </a:r>
-            <a:r>
-              <a:rPr lang="en-US" sz="2800" dirty="0" smtClean="0"/>
-              <a:t> </a:t>
-            </a:r>
-            <a:r>
-              <a:rPr lang="en-US" sz="2800" dirty="0" err="1" smtClean="0"/>
-              <a:t>chung</a:t>
-            </a:r>
-            <a:r>
-              <a:rPr lang="en-US" sz="2800" dirty="0" smtClean="0"/>
-              <a:t> 1 </a:t>
-            </a:r>
-            <a:r>
-              <a:rPr lang="en-US" sz="2800" dirty="0" err="1" smtClean="0"/>
-              <a:t>kênh</a:t>
-            </a:r>
-            <a:endParaRPr lang="en-US" sz="2800" dirty="0"/>
-          </a:p>
-        </p:txBody>
-      </p:sp>
-      <p:grpSp>
-        <p:nvGrpSpPr>
-          <p:cNvPr id="4" name="Group 3"/>
-          <p:cNvGrpSpPr/>
-          <p:nvPr/>
-        </p:nvGrpSpPr>
-        <p:grpSpPr>
-          <a:xfrm>
-            <a:off x="1956386" y="1341394"/>
-            <a:ext cx="5812757" cy="4014573"/>
-            <a:chOff x="1956386" y="1341394"/>
-            <a:chExt cx="5812757" cy="4014573"/>
-          </a:xfrm>
-        </p:grpSpPr>
-        <p:grpSp>
-          <p:nvGrpSpPr>
-            <p:cNvPr id="3" name="Group 2"/>
-            <p:cNvGrpSpPr/>
-            <p:nvPr/>
-          </p:nvGrpSpPr>
-          <p:grpSpPr>
-            <a:xfrm>
-              <a:off x="1956386" y="1341394"/>
-              <a:ext cx="5460083" cy="3535405"/>
-              <a:chOff x="1699202" y="1371598"/>
-              <a:chExt cx="5968424" cy="4013202"/>
-            </a:xfrm>
-          </p:grpSpPr>
-          <p:pic>
-            <p:nvPicPr>
-              <p:cNvPr id="1028" name="Picture 4" descr="https://scontent.fhan5-5.fna.fbcdn.net/v/t1.15752-9/34258723_1243289652474007_3949081545154756608_n.png?_nc_cat=0&amp;oh=7115f9fa53c3fb49540f40111d05d81e&amp;oe=5BBDF0DE"/>
-              <p:cNvPicPr>
-                <a:picLocks noChangeAspect="1" noChangeArrowheads="1"/>
-              </p:cNvPicPr>
-              <p:nvPr/>
-            </p:nvPicPr>
-            <p:blipFill>
-              <a:blip r:embed="rId2" cstate="print">
-                <a:extLst>
-                  <a:ext uri="{28A0092B-C50C-407E-A947-70E740481C1C}">
-                    <a14:useLocalDpi xmlns:a14="http://schemas.microsoft.com/office/drawing/2010/main" val="0"/>
-                  </a:ext>
-                </a:extLst>
-              </a:blip>
-              <a:srcRect/>
-              <a:stretch>
-                <a:fillRect/>
-              </a:stretch>
-            </p:blipFill>
-            <p:spPr bwMode="auto">
-              <a:xfrm>
-                <a:off x="5410200" y="1371599"/>
-                <a:ext cx="2257426" cy="4013201"/>
-              </a:xfrm>
-              <a:prstGeom prst="rect">
-                <a:avLst/>
-              </a:prstGeom>
-              <a:noFill/>
-              <a:extLst>
-                <a:ext uri="{909E8E84-426E-40DD-AFC4-6F175D3DCCD1}">
-                  <a14:hiddenFill xmlns:a14="http://schemas.microsoft.com/office/drawing/2010/main">
-                    <a:solidFill>
-                      <a:srgbClr val="FFFFFF"/>
-                    </a:solidFill>
-                  </a14:hiddenFill>
-                </a:ext>
-              </a:extLst>
-            </p:spPr>
-          </p:pic>
-          <p:pic>
-            <p:nvPicPr>
-              <p:cNvPr id="1030" name="Picture 6" descr="https://scontent.fhan5-5.fna.fbcdn.net/v/t1.15752-9/34321862_1243292122473760_5429512198915358720_n.png?_nc_cat=0&amp;oh=df88a9b28bf6a41448b15961b01966e1&amp;oe=5B82613D"/>
-              <p:cNvPicPr>
-                <a:picLocks noChangeAspect="1" noChangeArrowheads="1"/>
-              </p:cNvPicPr>
-              <p:nvPr/>
-            </p:nvPicPr>
-            <p:blipFill>
-              <a:blip r:embed="rId3" cstate="print">
-                <a:extLst>
-                  <a:ext uri="{28A0092B-C50C-407E-A947-70E740481C1C}">
-                    <a14:useLocalDpi xmlns:a14="http://schemas.microsoft.com/office/drawing/2010/main" val="0"/>
-                  </a:ext>
-                </a:extLst>
-              </a:blip>
-              <a:srcRect/>
-              <a:stretch>
-                <a:fillRect/>
-              </a:stretch>
-            </p:blipFill>
-            <p:spPr bwMode="auto">
-              <a:xfrm>
-                <a:off x="1699202" y="1371598"/>
-                <a:ext cx="2257426" cy="4013201"/>
-              </a:xfrm>
-              <a:prstGeom prst="rect">
-                <a:avLst/>
-              </a:prstGeom>
-              <a:noFill/>
-              <a:extLst>
-                <a:ext uri="{909E8E84-426E-40DD-AFC4-6F175D3DCCD1}">
-                  <a14:hiddenFill xmlns:a14="http://schemas.microsoft.com/office/drawing/2010/main">
-                    <a:solidFill>
-                      <a:srgbClr val="FFFFFF"/>
-                    </a:solidFill>
-                  </a14:hiddenFill>
-                </a:ext>
-              </a:extLst>
-            </p:spPr>
-          </p:pic>
-        </p:grpSp>
-        <p:sp>
-          <p:nvSpPr>
-            <p:cNvPr id="6" name="TextBox 5"/>
-            <p:cNvSpPr txBox="1"/>
-            <p:nvPr/>
-          </p:nvSpPr>
-          <p:spPr>
-            <a:xfrm>
-              <a:off x="2569906" y="4876800"/>
-              <a:ext cx="1205715" cy="461665"/>
-            </a:xfrm>
-            <a:prstGeom prst="rect">
-              <a:avLst/>
-            </a:prstGeom>
-            <a:noFill/>
-          </p:spPr>
-          <p:txBody>
-            <a:bodyPr wrap="none" rtlCol="0">
-              <a:spAutoFit/>
-            </a:bodyPr>
-            <a:lstStyle/>
-            <a:p>
-              <a:r>
-                <a:rPr lang="en-US" sz="2400" dirty="0" smtClean="0"/>
-                <a:t>Website</a:t>
-              </a:r>
-              <a:endParaRPr lang="en-US" sz="2400" dirty="0"/>
-            </a:p>
-          </p:txBody>
-        </p:sp>
-        <p:sp>
-          <p:nvSpPr>
-            <p:cNvPr id="7" name="TextBox 6"/>
-            <p:cNvSpPr txBox="1"/>
-            <p:nvPr/>
-          </p:nvSpPr>
-          <p:spPr>
-            <a:xfrm>
-              <a:off x="5105400" y="4894302"/>
-              <a:ext cx="2663743" cy="461665"/>
-            </a:xfrm>
-            <a:prstGeom prst="rect">
-              <a:avLst/>
-            </a:prstGeom>
-            <a:noFill/>
-          </p:spPr>
-          <p:txBody>
-            <a:bodyPr wrap="none" rtlCol="0">
-              <a:spAutoFit/>
-            </a:bodyPr>
-            <a:lstStyle/>
-            <a:p>
-              <a:r>
-                <a:rPr lang="en-US" sz="2400" dirty="0" smtClean="0"/>
-                <a:t>Android Application</a:t>
-              </a:r>
-            </a:p>
-          </p:txBody>
-        </p:sp>
-      </p:grpSp>
+            <a:endParaRPr lang="en-GB"/>
+          </a:p>
+        </p:txBody>
+      </p:sp>
     </p:spTree>
     <p:extLst>
       <p:ext uri="{BB962C8B-B14F-4D97-AF65-F5344CB8AC3E}">
-        <p14:creationId xmlns:p14="http://schemas.microsoft.com/office/powerpoint/2010/main" val="2861707972"/>
+        <p14:creationId xmlns:p14="http://schemas.microsoft.com/office/powerpoint/2010/main" val="3375238752"/>
       </p:ext>
     </p:extLst>
   </p:cSld>
   <p:clrMapOvr>
     <a:masterClrMapping/>
   </p:clrMapOvr>
-  <p:timing>
-    <p:tnLst>
-      <p:par>
-        <p:cTn id="1" dur="indefinite" restart="never" nodeType="tmRoot"/>
-      </p:par>
-    </p:tnLst>
-  </p:timing>
 </p:sld>
 </file>
 
@@ -5003,182 +5444,1449 @@
           <a:p>
             <a:r>
               <a:rPr lang="en-US" dirty="0" smtClean="0"/>
-              <a:t>Service</a:t>
-            </a:r>
-            <a:endParaRPr lang="en-US" dirty="0"/>
-          </a:p>
-        </p:txBody>
-      </p:sp>
-      <p:sp>
-        <p:nvSpPr>
-          <p:cNvPr id="3" name="Content Placeholder 2"/>
-          <p:cNvSpPr>
-            <a:spLocks noGrp="1"/>
-          </p:cNvSpPr>
-          <p:nvPr>
-            <p:ph idx="1"/>
-          </p:nvPr>
-        </p:nvSpPr>
-        <p:spPr/>
-        <p:txBody>
-          <a:bodyPr/>
-          <a:lstStyle/>
-          <a:p>
-            <a:r>
-              <a:rPr lang="en-US" dirty="0" smtClean="0"/>
-              <a:t>Chia </a:t>
-            </a:r>
-            <a:r>
-              <a:rPr lang="en-US" dirty="0" err="1" smtClean="0"/>
-              <a:t>sẻ</a:t>
-            </a:r>
-            <a:r>
-              <a:rPr lang="en-US" dirty="0" smtClean="0"/>
+              <a:t>OTHER !!!</a:t>
+            </a:r>
+            <a:endParaRPr lang="en-GB" dirty="0"/>
+          </a:p>
+        </p:txBody>
+      </p:sp>
+      <p:sp>
+        <p:nvSpPr>
+          <p:cNvPr id="6" name="Oval 5"/>
+          <p:cNvSpPr/>
+          <p:nvPr/>
+        </p:nvSpPr>
+        <p:spPr>
+          <a:xfrm>
+            <a:off x="5562600" y="2156989"/>
+            <a:ext cx="2895600" cy="990600"/>
+          </a:xfrm>
+          <a:prstGeom prst="ellipse">
+            <a:avLst/>
+          </a:prstGeom>
+        </p:spPr>
+        <p:style>
+          <a:lnRef idx="2">
+            <a:schemeClr val="accent1">
+              <a:shade val="50000"/>
+            </a:schemeClr>
+          </a:lnRef>
+          <a:fillRef idx="1">
+            <a:schemeClr val="accent1"/>
+          </a:fillRef>
+          <a:effectRef idx="0">
+            <a:schemeClr val="accent1"/>
+          </a:effectRef>
+          <a:fontRef idx="minor">
+            <a:schemeClr val="lt1"/>
+          </a:fontRef>
+        </p:style>
+        <p:txBody>
+          <a:bodyPr rtlCol="0" anchor="ctr"/>
+          <a:lstStyle/>
+          <a:p>
+            <a:pPr algn="ctr"/>
+            <a:r>
+              <a:rPr lang="en-US" sz="2800" dirty="0" smtClean="0"/>
+              <a:t>WEB SERVICE</a:t>
+            </a:r>
+            <a:endParaRPr lang="en-GB" sz="2800" dirty="0"/>
+          </a:p>
+        </p:txBody>
+      </p:sp>
+      <p:sp>
+        <p:nvSpPr>
+          <p:cNvPr id="27" name="TextBox 26"/>
+          <p:cNvSpPr txBox="1"/>
+          <p:nvPr/>
+        </p:nvSpPr>
+        <p:spPr>
+          <a:xfrm>
+            <a:off x="1110796" y="5943600"/>
+            <a:ext cx="6664389" cy="523220"/>
+          </a:xfrm>
+          <a:prstGeom prst="rect">
+            <a:avLst/>
+          </a:prstGeom>
+          <a:noFill/>
+        </p:spPr>
+        <p:txBody>
+          <a:bodyPr wrap="none" rtlCol="0">
+            <a:spAutoFit/>
+          </a:bodyPr>
+          <a:lstStyle/>
+          <a:p>
+            <a:r>
+              <a:rPr lang="en-US" sz="2800" dirty="0" err="1" smtClean="0"/>
+              <a:t>Kết</a:t>
+            </a:r>
+            <a:r>
+              <a:rPr lang="en-US" sz="2800" dirty="0" smtClean="0"/>
               <a:t> </a:t>
             </a:r>
             <a:r>
-              <a:rPr lang="en-US" dirty="0" err="1" smtClean="0"/>
-              <a:t>thông</a:t>
-            </a:r>
-            <a:r>
-              <a:rPr lang="en-US" dirty="0" smtClean="0"/>
-              <a:t> tin </a:t>
-            </a:r>
-            <a:r>
-              <a:rPr lang="en-US" dirty="0" err="1" smtClean="0"/>
-              <a:t>giữa</a:t>
-            </a:r>
-            <a:r>
-              <a:rPr lang="en-US" dirty="0" smtClean="0"/>
+              <a:rPr lang="en-US" sz="2800" dirty="0" err="1" smtClean="0"/>
+              <a:t>nối</a:t>
+            </a:r>
+            <a:r>
+              <a:rPr lang="en-US" sz="2800" dirty="0" smtClean="0"/>
               <a:t> </a:t>
             </a:r>
             <a:r>
-              <a:rPr lang="en-US" dirty="0" err="1" smtClean="0"/>
-              <a:t>các</a:t>
-            </a:r>
-            <a:r>
-              <a:rPr lang="en-US" dirty="0" smtClean="0"/>
+              <a:rPr lang="en-US" sz="2800" dirty="0" err="1" smtClean="0"/>
+              <a:t>nền</a:t>
+            </a:r>
+            <a:r>
+              <a:rPr lang="en-US" sz="2800" dirty="0" smtClean="0"/>
               <a:t> </a:t>
             </a:r>
             <a:r>
-              <a:rPr lang="en-US" dirty="0" err="1" smtClean="0"/>
-              <a:t>nền</a:t>
-            </a:r>
-            <a:r>
-              <a:rPr lang="en-US" dirty="0" smtClean="0"/>
+              <a:rPr lang="en-US" sz="2800" dirty="0" err="1" smtClean="0"/>
+              <a:t>tảng</a:t>
+            </a:r>
+            <a:r>
+              <a:rPr lang="en-US" sz="2800" dirty="0" smtClean="0"/>
+              <a:t> (</a:t>
+            </a:r>
+            <a:r>
+              <a:rPr lang="en-US" sz="2800" dirty="0" err="1" smtClean="0"/>
+              <a:t>hệ</a:t>
+            </a:r>
+            <a:r>
+              <a:rPr lang="en-US" sz="2800" dirty="0" smtClean="0"/>
               <a:t> </a:t>
             </a:r>
             <a:r>
-              <a:rPr lang="en-US" dirty="0" err="1" smtClean="0"/>
-              <a:t>tảng</a:t>
-            </a:r>
-            <a:endParaRPr lang="en-US" dirty="0" smtClean="0"/>
-          </a:p>
-          <a:p>
-            <a:r>
-              <a:rPr lang="en-US" dirty="0" err="1" smtClean="0"/>
-              <a:t>Xóa</a:t>
-            </a:r>
-            <a:r>
-              <a:rPr lang="en-US" dirty="0" smtClean="0"/>
+              <a:rPr lang="en-US" sz="2800" dirty="0" err="1" smtClean="0"/>
+              <a:t>điều</a:t>
+            </a:r>
+            <a:r>
+              <a:rPr lang="en-US" sz="2800" dirty="0" smtClean="0"/>
               <a:t> </a:t>
             </a:r>
             <a:r>
-              <a:rPr lang="en-US" dirty="0" err="1" smtClean="0"/>
-              <a:t>bỏ</a:t>
-            </a:r>
-            <a:r>
-              <a:rPr lang="en-US" dirty="0" smtClean="0"/>
+              <a:rPr lang="en-US" sz="2800" dirty="0" err="1" smtClean="0"/>
+              <a:t>hành</a:t>
+            </a:r>
+            <a:r>
+              <a:rPr lang="en-US" sz="2800" dirty="0" smtClean="0"/>
+              <a:t>) </a:t>
+            </a:r>
+            <a:r>
+              <a:rPr lang="en-US" sz="2800" dirty="0" err="1" smtClean="0"/>
+              <a:t>và</a:t>
+            </a:r>
+            <a:r>
+              <a:rPr lang="en-US" sz="2800" dirty="0" smtClean="0"/>
               <a:t> </a:t>
             </a:r>
             <a:r>
-              <a:rPr lang="en-US" dirty="0" err="1" smtClean="0"/>
-              <a:t>rào</a:t>
-            </a:r>
-            <a:r>
-              <a:rPr lang="en-US" dirty="0" smtClean="0"/>
+              <a:rPr lang="en-US" sz="2800" dirty="0" err="1" smtClean="0"/>
+              <a:t>ngôn</a:t>
+            </a:r>
+            <a:r>
+              <a:rPr lang="en-US" sz="2800" dirty="0" smtClean="0"/>
               <a:t> </a:t>
             </a:r>
             <a:r>
-              <a:rPr lang="en-US" dirty="0" err="1" smtClean="0"/>
-              <a:t>cản</a:t>
-            </a:r>
-            <a:r>
-              <a:rPr lang="en-US" dirty="0" smtClean="0"/>
-              <a:t> </a:t>
-            </a:r>
-            <a:r>
-              <a:rPr lang="en-US" dirty="0" err="1" smtClean="0"/>
-              <a:t>các</a:t>
-            </a:r>
-            <a:r>
-              <a:rPr lang="en-US" dirty="0" smtClean="0"/>
-              <a:t> </a:t>
-            </a:r>
-            <a:r>
-              <a:rPr lang="en-US" dirty="0" err="1" smtClean="0"/>
-              <a:t>ứng</a:t>
-            </a:r>
-            <a:r>
-              <a:rPr lang="en-US" dirty="0" smtClean="0"/>
-              <a:t> </a:t>
-            </a:r>
-            <a:r>
-              <a:rPr lang="en-US" dirty="0" err="1" smtClean="0"/>
-              <a:t>dụng</a:t>
-            </a:r>
-            <a:endParaRPr lang="en-US" dirty="0" smtClean="0"/>
-          </a:p>
-          <a:p>
-            <a:r>
-              <a:rPr lang="en-US" dirty="0" err="1" smtClean="0"/>
-              <a:t>Tiết</a:t>
-            </a:r>
-            <a:r>
-              <a:rPr lang="en-US" dirty="0" smtClean="0"/>
-              <a:t> </a:t>
-            </a:r>
-            <a:r>
-              <a:rPr lang="en-US" dirty="0" err="1" smtClean="0"/>
-              <a:t>kiệm</a:t>
-            </a:r>
-            <a:r>
-              <a:rPr lang="en-US" dirty="0" smtClean="0"/>
-              <a:t> </a:t>
-            </a:r>
-            <a:r>
-              <a:rPr lang="en-US" dirty="0" err="1" smtClean="0"/>
-              <a:t>chị</a:t>
-            </a:r>
-            <a:r>
-              <a:rPr lang="en-US" dirty="0" smtClean="0"/>
-              <a:t> </a:t>
-            </a:r>
-            <a:r>
-              <a:rPr lang="en-US" dirty="0" err="1" smtClean="0"/>
-              <a:t>phí</a:t>
-            </a:r>
-            <a:endParaRPr lang="en-US" dirty="0"/>
+              <a:rPr lang="en-US" sz="2800" dirty="0" err="1" smtClean="0"/>
+              <a:t>ngữ</a:t>
+            </a:r>
+            <a:endParaRPr lang="en-GB" sz="2800" dirty="0"/>
+          </a:p>
+        </p:txBody>
+      </p:sp>
+      <p:sp>
+        <p:nvSpPr>
+          <p:cNvPr id="28" name="AutoShape 2" descr="Image result for C#"/>
+          <p:cNvSpPr>
+            <a:spLocks noChangeAspect="1" noChangeArrowheads="1"/>
+          </p:cNvSpPr>
+          <p:nvPr/>
+        </p:nvSpPr>
+        <p:spPr bwMode="auto">
+          <a:xfrm>
+            <a:off x="155575" y="-144463"/>
+            <a:ext cx="304800" cy="304801"/>
+          </a:xfrm>
+          <a:prstGeom prst="rect">
+            <a:avLst/>
+          </a:prstGeom>
+          <a:noFill/>
+          <a:extLst>
+            <a:ext uri="{909E8E84-426E-40DD-AFC4-6F175D3DCCD1}">
+              <a14:hiddenFill xmlns:a14="http://schemas.microsoft.com/office/drawing/2010/main">
+                <a:solidFill>
+                  <a:srgbClr val="FFFFFF"/>
+                </a:solidFill>
+              </a14:hiddenFill>
+            </a:ext>
+          </a:extLst>
+        </p:spPr>
+        <p:txBody>
+          <a:bodyPr vert="horz" wrap="square" lIns="91440" tIns="45720" rIns="91440" bIns="45720" numCol="1" anchor="t" anchorCtr="0" compatLnSpc="1">
+            <a:prstTxWarp prst="textNoShape">
+              <a:avLst/>
+            </a:prstTxWarp>
+          </a:bodyPr>
+          <a:lstStyle/>
+          <a:p>
+            <a:endParaRPr lang="en-GB"/>
+          </a:p>
+        </p:txBody>
+      </p:sp>
+      <p:sp>
+        <p:nvSpPr>
+          <p:cNvPr id="29" name="AutoShape 4" descr="Image result for C#"/>
+          <p:cNvSpPr>
+            <a:spLocks noChangeAspect="1" noChangeArrowheads="1"/>
+          </p:cNvSpPr>
+          <p:nvPr/>
+        </p:nvSpPr>
+        <p:spPr bwMode="auto">
+          <a:xfrm>
+            <a:off x="307975" y="7937"/>
+            <a:ext cx="304800" cy="304801"/>
+          </a:xfrm>
+          <a:prstGeom prst="rect">
+            <a:avLst/>
+          </a:prstGeom>
+          <a:noFill/>
+          <a:extLst>
+            <a:ext uri="{909E8E84-426E-40DD-AFC4-6F175D3DCCD1}">
+              <a14:hiddenFill xmlns:a14="http://schemas.microsoft.com/office/drawing/2010/main">
+                <a:solidFill>
+                  <a:srgbClr val="FFFFFF"/>
+                </a:solidFill>
+              </a14:hiddenFill>
+            </a:ext>
+          </a:extLst>
+        </p:spPr>
+        <p:txBody>
+          <a:bodyPr vert="horz" wrap="square" lIns="91440" tIns="45720" rIns="91440" bIns="45720" numCol="1" anchor="t" anchorCtr="0" compatLnSpc="1">
+            <a:prstTxWarp prst="textNoShape">
+              <a:avLst/>
+            </a:prstTxWarp>
+          </a:bodyPr>
+          <a:lstStyle/>
+          <a:p>
+            <a:endParaRPr lang="en-GB"/>
+          </a:p>
+        </p:txBody>
+      </p:sp>
+      <p:sp>
+        <p:nvSpPr>
+          <p:cNvPr id="30" name="AutoShape 6" descr="Image result for C#"/>
+          <p:cNvSpPr>
+            <a:spLocks noChangeAspect="1" noChangeArrowheads="1"/>
+          </p:cNvSpPr>
+          <p:nvPr/>
+        </p:nvSpPr>
+        <p:spPr bwMode="auto">
+          <a:xfrm>
+            <a:off x="460375" y="160337"/>
+            <a:ext cx="304800" cy="304801"/>
+          </a:xfrm>
+          <a:prstGeom prst="rect">
+            <a:avLst/>
+          </a:prstGeom>
+          <a:noFill/>
+          <a:extLst>
+            <a:ext uri="{909E8E84-426E-40DD-AFC4-6F175D3DCCD1}">
+              <a14:hiddenFill xmlns:a14="http://schemas.microsoft.com/office/drawing/2010/main">
+                <a:solidFill>
+                  <a:srgbClr val="FFFFFF"/>
+                </a:solidFill>
+              </a14:hiddenFill>
+            </a:ext>
+          </a:extLst>
+        </p:spPr>
+        <p:txBody>
+          <a:bodyPr vert="horz" wrap="square" lIns="91440" tIns="45720" rIns="91440" bIns="45720" numCol="1" anchor="t" anchorCtr="0" compatLnSpc="1">
+            <a:prstTxWarp prst="textNoShape">
+              <a:avLst/>
+            </a:prstTxWarp>
+          </a:bodyPr>
+          <a:lstStyle/>
+          <a:p>
+            <a:endParaRPr lang="en-GB"/>
+          </a:p>
+        </p:txBody>
+      </p:sp>
+      <p:sp>
+        <p:nvSpPr>
+          <p:cNvPr id="31" name="AutoShape 8" descr="Image result for C#"/>
+          <p:cNvSpPr>
+            <a:spLocks noChangeAspect="1" noChangeArrowheads="1"/>
+          </p:cNvSpPr>
+          <p:nvPr/>
+        </p:nvSpPr>
+        <p:spPr bwMode="auto">
+          <a:xfrm>
+            <a:off x="612775" y="312737"/>
+            <a:ext cx="304800" cy="304801"/>
+          </a:xfrm>
+          <a:prstGeom prst="rect">
+            <a:avLst/>
+          </a:prstGeom>
+          <a:noFill/>
+          <a:extLst>
+            <a:ext uri="{909E8E84-426E-40DD-AFC4-6F175D3DCCD1}">
+              <a14:hiddenFill xmlns:a14="http://schemas.microsoft.com/office/drawing/2010/main">
+                <a:solidFill>
+                  <a:srgbClr val="FFFFFF"/>
+                </a:solidFill>
+              </a14:hiddenFill>
+            </a:ext>
+          </a:extLst>
+        </p:spPr>
+        <p:txBody>
+          <a:bodyPr vert="horz" wrap="square" lIns="91440" tIns="45720" rIns="91440" bIns="45720" numCol="1" anchor="t" anchorCtr="0" compatLnSpc="1">
+            <a:prstTxWarp prst="textNoShape">
+              <a:avLst/>
+            </a:prstTxWarp>
+          </a:bodyPr>
+          <a:lstStyle/>
+          <a:p>
+            <a:endParaRPr lang="en-GB"/>
+          </a:p>
+        </p:txBody>
+      </p:sp>
+      <p:sp>
+        <p:nvSpPr>
+          <p:cNvPr id="32" name="AutoShape 10" descr="Image result for C#"/>
+          <p:cNvSpPr>
+            <a:spLocks noChangeAspect="1" noChangeArrowheads="1"/>
+          </p:cNvSpPr>
+          <p:nvPr/>
+        </p:nvSpPr>
+        <p:spPr bwMode="auto">
+          <a:xfrm>
+            <a:off x="765175" y="465137"/>
+            <a:ext cx="304800" cy="304801"/>
+          </a:xfrm>
+          <a:prstGeom prst="rect">
+            <a:avLst/>
+          </a:prstGeom>
+          <a:noFill/>
+          <a:extLst>
+            <a:ext uri="{909E8E84-426E-40DD-AFC4-6F175D3DCCD1}">
+              <a14:hiddenFill xmlns:a14="http://schemas.microsoft.com/office/drawing/2010/main">
+                <a:solidFill>
+                  <a:srgbClr val="FFFFFF"/>
+                </a:solidFill>
+              </a14:hiddenFill>
+            </a:ext>
+          </a:extLst>
+        </p:spPr>
+        <p:txBody>
+          <a:bodyPr vert="horz" wrap="square" lIns="91440" tIns="45720" rIns="91440" bIns="45720" numCol="1" anchor="t" anchorCtr="0" compatLnSpc="1">
+            <a:prstTxWarp prst="textNoShape">
+              <a:avLst/>
+            </a:prstTxWarp>
+          </a:bodyPr>
+          <a:lstStyle/>
+          <a:p>
+            <a:endParaRPr lang="en-GB"/>
+          </a:p>
+        </p:txBody>
+      </p:sp>
+      <p:grpSp>
+        <p:nvGrpSpPr>
+          <p:cNvPr id="45" name="Group 44"/>
+          <p:cNvGrpSpPr/>
+          <p:nvPr/>
+        </p:nvGrpSpPr>
+        <p:grpSpPr>
+          <a:xfrm>
+            <a:off x="3120818" y="3683388"/>
+            <a:ext cx="2001741" cy="1507331"/>
+            <a:chOff x="1555750" y="3333749"/>
+            <a:chExt cx="2001741" cy="1507331"/>
+          </a:xfrm>
+        </p:grpSpPr>
+        <p:pic>
+          <p:nvPicPr>
+            <p:cNvPr id="11" name="Picture 10" descr="Image result for idea"/>
+            <p:cNvPicPr>
+              <a:picLocks noChangeAspect="1" noChangeArrowheads="1"/>
+            </p:cNvPicPr>
+            <p:nvPr/>
+          </p:nvPicPr>
+          <p:blipFill>
+            <a:blip r:embed="rId2">
+              <a:extLst>
+                <a:ext uri="{28A0092B-C50C-407E-A947-70E740481C1C}">
+                  <a14:useLocalDpi xmlns:a14="http://schemas.microsoft.com/office/drawing/2010/main" val="0"/>
+                </a:ext>
+              </a:extLst>
+            </a:blip>
+            <a:srcRect/>
+            <a:stretch>
+              <a:fillRect/>
+            </a:stretch>
+          </p:blipFill>
+          <p:spPr bwMode="auto">
+            <a:xfrm>
+              <a:off x="1555750" y="3333749"/>
+              <a:ext cx="1409700" cy="1409701"/>
+            </a:xfrm>
+            <a:prstGeom prst="rect">
+              <a:avLst/>
+            </a:prstGeom>
+            <a:extLst/>
+          </p:spPr>
+          <p:style>
+            <a:lnRef idx="2">
+              <a:schemeClr val="accent3"/>
+            </a:lnRef>
+            <a:fillRef idx="1">
+              <a:schemeClr val="lt1"/>
+            </a:fillRef>
+            <a:effectRef idx="0">
+              <a:schemeClr val="accent3"/>
+            </a:effectRef>
+            <a:fontRef idx="minor">
+              <a:schemeClr val="dk1"/>
+            </a:fontRef>
+          </p:style>
+        </p:pic>
+        <p:pic>
+          <p:nvPicPr>
+            <p:cNvPr id="3086" name="Picture 14" descr="Image result for java"/>
+            <p:cNvPicPr>
+              <a:picLocks noChangeAspect="1" noChangeArrowheads="1"/>
+            </p:cNvPicPr>
+            <p:nvPr/>
+          </p:nvPicPr>
+          <p:blipFill>
+            <a:blip r:embed="rId3">
+              <a:extLst>
+                <a:ext uri="{28A0092B-C50C-407E-A947-70E740481C1C}">
+                  <a14:useLocalDpi xmlns:a14="http://schemas.microsoft.com/office/drawing/2010/main" val="0"/>
+                </a:ext>
+              </a:extLst>
+            </a:blip>
+            <a:srcRect/>
+            <a:stretch>
+              <a:fillRect/>
+            </a:stretch>
+          </p:blipFill>
+          <p:spPr bwMode="auto">
+            <a:xfrm>
+              <a:off x="2703609" y="4302919"/>
+              <a:ext cx="853882" cy="538161"/>
+            </a:xfrm>
+            <a:prstGeom prst="rect">
+              <a:avLst/>
+            </a:prstGeom>
+          </p:spPr>
+          <p:style>
+            <a:lnRef idx="2">
+              <a:schemeClr val="accent3"/>
+            </a:lnRef>
+            <a:fillRef idx="1">
+              <a:schemeClr val="lt1"/>
+            </a:fillRef>
+            <a:effectRef idx="0">
+              <a:schemeClr val="accent3"/>
+            </a:effectRef>
+            <a:fontRef idx="minor">
+              <a:schemeClr val="dk1"/>
+            </a:fontRef>
+          </p:style>
+        </p:pic>
+      </p:grpSp>
+      <p:grpSp>
+        <p:nvGrpSpPr>
+          <p:cNvPr id="47" name="Group 46"/>
+          <p:cNvGrpSpPr/>
+          <p:nvPr/>
+        </p:nvGrpSpPr>
+        <p:grpSpPr>
+          <a:xfrm>
+            <a:off x="3095418" y="1638299"/>
+            <a:ext cx="1571832" cy="1462507"/>
+            <a:chOff x="1543050" y="1638299"/>
+            <a:chExt cx="1571832" cy="1462507"/>
+          </a:xfrm>
+        </p:grpSpPr>
+        <p:pic>
+          <p:nvPicPr>
+            <p:cNvPr id="5" name="Picture 4" descr="Image result for idea"/>
+            <p:cNvPicPr>
+              <a:picLocks noChangeAspect="1" noChangeArrowheads="1"/>
+            </p:cNvPicPr>
+            <p:nvPr/>
+          </p:nvPicPr>
+          <p:blipFill>
+            <a:blip r:embed="rId2">
+              <a:extLst>
+                <a:ext uri="{28A0092B-C50C-407E-A947-70E740481C1C}">
+                  <a14:useLocalDpi xmlns:a14="http://schemas.microsoft.com/office/drawing/2010/main" val="0"/>
+                </a:ext>
+              </a:extLst>
+            </a:blip>
+            <a:srcRect/>
+            <a:stretch>
+              <a:fillRect/>
+            </a:stretch>
+          </p:blipFill>
+          <p:spPr bwMode="auto">
+            <a:xfrm>
+              <a:off x="1543050" y="1638299"/>
+              <a:ext cx="1409700" cy="1409701"/>
+            </a:xfrm>
+            <a:prstGeom prst="rect">
+              <a:avLst/>
+            </a:prstGeom>
+            <a:extLst/>
+          </p:spPr>
+          <p:style>
+            <a:lnRef idx="2">
+              <a:schemeClr val="accent3"/>
+            </a:lnRef>
+            <a:fillRef idx="1">
+              <a:schemeClr val="lt1"/>
+            </a:fillRef>
+            <a:effectRef idx="0">
+              <a:schemeClr val="accent3"/>
+            </a:effectRef>
+            <a:fontRef idx="minor">
+              <a:schemeClr val="dk1"/>
+            </a:fontRef>
+          </p:style>
+        </p:pic>
+        <p:pic>
+          <p:nvPicPr>
+            <p:cNvPr id="3090" name="Picture 18" descr="Image result for C#"/>
+            <p:cNvPicPr>
+              <a:picLocks noChangeAspect="1" noChangeArrowheads="1"/>
+            </p:cNvPicPr>
+            <p:nvPr/>
+          </p:nvPicPr>
+          <p:blipFill>
+            <a:blip r:embed="rId4">
+              <a:extLst>
+                <a:ext uri="{28A0092B-C50C-407E-A947-70E740481C1C}">
+                  <a14:useLocalDpi xmlns:a14="http://schemas.microsoft.com/office/drawing/2010/main" val="0"/>
+                </a:ext>
+              </a:extLst>
+            </a:blip>
+            <a:srcRect/>
+            <a:stretch>
+              <a:fillRect/>
+            </a:stretch>
+          </p:blipFill>
+          <p:spPr bwMode="auto">
+            <a:xfrm>
+              <a:off x="2666365" y="2652289"/>
+              <a:ext cx="448517" cy="448517"/>
+            </a:xfrm>
+            <a:prstGeom prst="rect">
+              <a:avLst/>
+            </a:prstGeom>
+          </p:spPr>
+          <p:style>
+            <a:lnRef idx="2">
+              <a:schemeClr val="accent3"/>
+            </a:lnRef>
+            <a:fillRef idx="1">
+              <a:schemeClr val="lt1"/>
+            </a:fillRef>
+            <a:effectRef idx="0">
+              <a:schemeClr val="accent3"/>
+            </a:effectRef>
+            <a:fontRef idx="minor">
+              <a:schemeClr val="dk1"/>
+            </a:fontRef>
+          </p:style>
+        </p:pic>
+      </p:grpSp>
+      <p:pic>
+        <p:nvPicPr>
+          <p:cNvPr id="3092" name="Picture 20" descr="Image result for chrome"/>
+          <p:cNvPicPr>
+            <a:picLocks noChangeAspect="1" noChangeArrowheads="1"/>
+          </p:cNvPicPr>
+          <p:nvPr/>
+        </p:nvPicPr>
+        <p:blipFill>
+          <a:blip r:embed="rId5">
+            <a:extLst>
+              <a:ext uri="{28A0092B-C50C-407E-A947-70E740481C1C}">
+                <a14:useLocalDpi xmlns:a14="http://schemas.microsoft.com/office/drawing/2010/main" val="0"/>
+              </a:ext>
+            </a:extLst>
+          </a:blip>
+          <a:srcRect/>
+          <a:stretch>
+            <a:fillRect/>
+          </a:stretch>
+        </p:blipFill>
+        <p:spPr bwMode="auto">
+          <a:xfrm flipV="1">
+            <a:off x="1244596" y="2385589"/>
+            <a:ext cx="533399" cy="533399"/>
+          </a:xfrm>
+          <a:prstGeom prst="rect">
+            <a:avLst/>
+          </a:prstGeom>
+        </p:spPr>
+        <p:style>
+          <a:lnRef idx="2">
+            <a:schemeClr val="accent3"/>
+          </a:lnRef>
+          <a:fillRef idx="1">
+            <a:schemeClr val="lt1"/>
+          </a:fillRef>
+          <a:effectRef idx="0">
+            <a:schemeClr val="accent3"/>
+          </a:effectRef>
+          <a:fontRef idx="minor">
+            <a:schemeClr val="dk1"/>
+          </a:fontRef>
+        </p:style>
+      </p:pic>
+      <p:pic>
+        <p:nvPicPr>
+          <p:cNvPr id="3094" name="Picture 22" descr="Image result for mobile"/>
+          <p:cNvPicPr>
+            <a:picLocks noChangeAspect="1" noChangeArrowheads="1"/>
+          </p:cNvPicPr>
+          <p:nvPr/>
+        </p:nvPicPr>
+        <p:blipFill>
+          <a:blip r:embed="rId6">
+            <a:extLst>
+              <a:ext uri="{28A0092B-C50C-407E-A947-70E740481C1C}">
+                <a14:useLocalDpi xmlns:a14="http://schemas.microsoft.com/office/drawing/2010/main" val="0"/>
+              </a:ext>
+            </a:extLst>
+          </a:blip>
+          <a:srcRect/>
+          <a:stretch>
+            <a:fillRect/>
+          </a:stretch>
+        </p:blipFill>
+        <p:spPr bwMode="auto">
+          <a:xfrm>
+            <a:off x="1183183" y="4519607"/>
+            <a:ext cx="652639" cy="704851"/>
+          </a:xfrm>
+          <a:prstGeom prst="rect">
+            <a:avLst/>
+          </a:prstGeom>
+        </p:spPr>
+        <p:style>
+          <a:lnRef idx="2">
+            <a:schemeClr val="accent3"/>
+          </a:lnRef>
+          <a:fillRef idx="1">
+            <a:schemeClr val="lt1"/>
+          </a:fillRef>
+          <a:effectRef idx="0">
+            <a:schemeClr val="accent3"/>
+          </a:effectRef>
+          <a:fontRef idx="minor">
+            <a:schemeClr val="dk1"/>
+          </a:fontRef>
+        </p:style>
+      </p:pic>
+      <p:pic>
+        <p:nvPicPr>
+          <p:cNvPr id="3096" name="Picture 24" descr="Image result for window 10"/>
+          <p:cNvPicPr>
+            <a:picLocks noChangeAspect="1" noChangeArrowheads="1"/>
+          </p:cNvPicPr>
+          <p:nvPr/>
+        </p:nvPicPr>
+        <p:blipFill>
+          <a:blip r:embed="rId7">
+            <a:extLst>
+              <a:ext uri="{28A0092B-C50C-407E-A947-70E740481C1C}">
+                <a14:useLocalDpi xmlns:a14="http://schemas.microsoft.com/office/drawing/2010/main" val="0"/>
+              </a:ext>
+            </a:extLst>
+          </a:blip>
+          <a:srcRect/>
+          <a:stretch>
+            <a:fillRect/>
+          </a:stretch>
+        </p:blipFill>
+        <p:spPr bwMode="auto">
+          <a:xfrm>
+            <a:off x="1212691" y="3333749"/>
+            <a:ext cx="593882" cy="463598"/>
+          </a:xfrm>
+          <a:prstGeom prst="rect">
+            <a:avLst/>
+          </a:prstGeom>
+        </p:spPr>
+        <p:style>
+          <a:lnRef idx="2">
+            <a:schemeClr val="accent3"/>
+          </a:lnRef>
+          <a:fillRef idx="1">
+            <a:schemeClr val="lt1"/>
+          </a:fillRef>
+          <a:effectRef idx="0">
+            <a:schemeClr val="accent3"/>
+          </a:effectRef>
+          <a:fontRef idx="minor">
+            <a:schemeClr val="dk1"/>
+          </a:fontRef>
+        </p:style>
+      </p:pic>
+      <p:sp>
+        <p:nvSpPr>
+          <p:cNvPr id="72" name="AutoShape 28" descr="Image result for ruby"/>
+          <p:cNvSpPr>
+            <a:spLocks noChangeAspect="1" noChangeArrowheads="1"/>
+          </p:cNvSpPr>
+          <p:nvPr/>
+        </p:nvSpPr>
+        <p:spPr bwMode="auto">
+          <a:xfrm>
+            <a:off x="917575" y="617537"/>
+            <a:ext cx="304800" cy="304801"/>
+          </a:xfrm>
+          <a:prstGeom prst="rect">
+            <a:avLst/>
+          </a:prstGeom>
+          <a:noFill/>
+          <a:extLst>
+            <a:ext uri="{909E8E84-426E-40DD-AFC4-6F175D3DCCD1}">
+              <a14:hiddenFill xmlns:a14="http://schemas.microsoft.com/office/drawing/2010/main">
+                <a:solidFill>
+                  <a:srgbClr val="FFFFFF"/>
+                </a:solidFill>
+              </a14:hiddenFill>
+            </a:ext>
+          </a:extLst>
+        </p:spPr>
+        <p:txBody>
+          <a:bodyPr vert="horz" wrap="square" lIns="91440" tIns="45720" rIns="91440" bIns="45720" numCol="1" anchor="t" anchorCtr="0" compatLnSpc="1">
+            <a:prstTxWarp prst="textNoShape">
+              <a:avLst/>
+            </a:prstTxWarp>
+          </a:bodyPr>
+          <a:lstStyle/>
+          <a:p>
+            <a:endParaRPr lang="en-GB"/>
+          </a:p>
+        </p:txBody>
+      </p:sp>
+      <p:sp>
+        <p:nvSpPr>
+          <p:cNvPr id="74" name="AutoShape 30" descr="Image result for ruby"/>
+          <p:cNvSpPr>
+            <a:spLocks noChangeAspect="1" noChangeArrowheads="1"/>
+          </p:cNvSpPr>
+          <p:nvPr/>
+        </p:nvSpPr>
+        <p:spPr bwMode="auto">
+          <a:xfrm>
+            <a:off x="1069975" y="769937"/>
+            <a:ext cx="304800" cy="304801"/>
+          </a:xfrm>
+          <a:prstGeom prst="rect">
+            <a:avLst/>
+          </a:prstGeom>
+          <a:noFill/>
+          <a:extLst>
+            <a:ext uri="{909E8E84-426E-40DD-AFC4-6F175D3DCCD1}">
+              <a14:hiddenFill xmlns:a14="http://schemas.microsoft.com/office/drawing/2010/main">
+                <a:solidFill>
+                  <a:srgbClr val="FFFFFF"/>
+                </a:solidFill>
+              </a14:hiddenFill>
+            </a:ext>
+          </a:extLst>
+        </p:spPr>
+        <p:txBody>
+          <a:bodyPr vert="horz" wrap="square" lIns="91440" tIns="45720" rIns="91440" bIns="45720" numCol="1" anchor="t" anchorCtr="0" compatLnSpc="1">
+            <a:prstTxWarp prst="textNoShape">
+              <a:avLst/>
+            </a:prstTxWarp>
+          </a:bodyPr>
+          <a:lstStyle/>
+          <a:p>
+            <a:endParaRPr lang="en-GB"/>
+          </a:p>
+        </p:txBody>
+      </p:sp>
+      <p:sp>
+        <p:nvSpPr>
+          <p:cNvPr id="75" name="AutoShape 32" descr="Image result for ruby"/>
+          <p:cNvSpPr>
+            <a:spLocks noChangeAspect="1" noChangeArrowheads="1"/>
+          </p:cNvSpPr>
+          <p:nvPr/>
+        </p:nvSpPr>
+        <p:spPr bwMode="auto">
+          <a:xfrm>
+            <a:off x="1222375" y="922337"/>
+            <a:ext cx="304800" cy="304801"/>
+          </a:xfrm>
+          <a:prstGeom prst="rect">
+            <a:avLst/>
+          </a:prstGeom>
+          <a:noFill/>
+          <a:extLst>
+            <a:ext uri="{909E8E84-426E-40DD-AFC4-6F175D3DCCD1}">
+              <a14:hiddenFill xmlns:a14="http://schemas.microsoft.com/office/drawing/2010/main">
+                <a:solidFill>
+                  <a:srgbClr val="FFFFFF"/>
+                </a:solidFill>
+              </a14:hiddenFill>
+            </a:ext>
+          </a:extLst>
+        </p:spPr>
+        <p:txBody>
+          <a:bodyPr vert="horz" wrap="square" lIns="91440" tIns="45720" rIns="91440" bIns="45720" numCol="1" anchor="t" anchorCtr="0" compatLnSpc="1">
+            <a:prstTxWarp prst="textNoShape">
+              <a:avLst/>
+            </a:prstTxWarp>
+          </a:bodyPr>
+          <a:lstStyle/>
+          <a:p>
+            <a:endParaRPr lang="en-GB"/>
+          </a:p>
+        </p:txBody>
+      </p:sp>
+      <p:sp>
+        <p:nvSpPr>
+          <p:cNvPr id="76" name="AutoShape 34" descr="Image result for ruby"/>
+          <p:cNvSpPr>
+            <a:spLocks noChangeAspect="1" noChangeArrowheads="1"/>
+          </p:cNvSpPr>
+          <p:nvPr/>
+        </p:nvSpPr>
+        <p:spPr bwMode="auto">
+          <a:xfrm>
+            <a:off x="1374775" y="1074737"/>
+            <a:ext cx="304800" cy="304801"/>
+          </a:xfrm>
+          <a:prstGeom prst="rect">
+            <a:avLst/>
+          </a:prstGeom>
+          <a:noFill/>
+          <a:extLst>
+            <a:ext uri="{909E8E84-426E-40DD-AFC4-6F175D3DCCD1}">
+              <a14:hiddenFill xmlns:a14="http://schemas.microsoft.com/office/drawing/2010/main">
+                <a:solidFill>
+                  <a:srgbClr val="FFFFFF"/>
+                </a:solidFill>
+              </a14:hiddenFill>
+            </a:ext>
+          </a:extLst>
+        </p:spPr>
+        <p:txBody>
+          <a:bodyPr vert="horz" wrap="square" lIns="91440" tIns="45720" rIns="91440" bIns="45720" numCol="1" anchor="t" anchorCtr="0" compatLnSpc="1">
+            <a:prstTxWarp prst="textNoShape">
+              <a:avLst/>
+            </a:prstTxWarp>
+          </a:bodyPr>
+          <a:lstStyle/>
+          <a:p>
+            <a:endParaRPr lang="en-GB"/>
+          </a:p>
+        </p:txBody>
+      </p:sp>
+      <p:sp>
+        <p:nvSpPr>
+          <p:cNvPr id="77" name="AutoShape 36" descr="Image result for Python"/>
+          <p:cNvSpPr>
+            <a:spLocks noChangeAspect="1" noChangeArrowheads="1"/>
+          </p:cNvSpPr>
+          <p:nvPr/>
+        </p:nvSpPr>
+        <p:spPr bwMode="auto">
+          <a:xfrm>
+            <a:off x="1527175" y="1227137"/>
+            <a:ext cx="304800" cy="304801"/>
+          </a:xfrm>
+          <a:prstGeom prst="rect">
+            <a:avLst/>
+          </a:prstGeom>
+          <a:noFill/>
+          <a:extLst>
+            <a:ext uri="{909E8E84-426E-40DD-AFC4-6F175D3DCCD1}">
+              <a14:hiddenFill xmlns:a14="http://schemas.microsoft.com/office/drawing/2010/main">
+                <a:solidFill>
+                  <a:srgbClr val="FFFFFF"/>
+                </a:solidFill>
+              </a14:hiddenFill>
+            </a:ext>
+          </a:extLst>
+        </p:spPr>
+        <p:txBody>
+          <a:bodyPr vert="horz" wrap="square" lIns="91440" tIns="45720" rIns="91440" bIns="45720" numCol="1" anchor="t" anchorCtr="0" compatLnSpc="1">
+            <a:prstTxWarp prst="textNoShape">
+              <a:avLst/>
+            </a:prstTxWarp>
+          </a:bodyPr>
+          <a:lstStyle/>
+          <a:p>
+            <a:endParaRPr lang="en-GB"/>
+          </a:p>
+        </p:txBody>
+      </p:sp>
+      <p:pic>
+        <p:nvPicPr>
+          <p:cNvPr id="99" name="Picture 14" descr="Image result for java"/>
+          <p:cNvPicPr>
+            <a:picLocks noChangeAspect="1" noChangeArrowheads="1"/>
+          </p:cNvPicPr>
+          <p:nvPr/>
+        </p:nvPicPr>
+        <p:blipFill>
+          <a:blip r:embed="rId3">
+            <a:extLst>
+              <a:ext uri="{28A0092B-C50C-407E-A947-70E740481C1C}">
+                <a14:useLocalDpi xmlns:a14="http://schemas.microsoft.com/office/drawing/2010/main" val="0"/>
+              </a:ext>
+            </a:extLst>
+          </a:blip>
+          <a:srcRect/>
+          <a:stretch>
+            <a:fillRect/>
+          </a:stretch>
+        </p:blipFill>
+        <p:spPr bwMode="auto">
+          <a:xfrm>
+            <a:off x="6515100" y="3898893"/>
+            <a:ext cx="853882" cy="538161"/>
+          </a:xfrm>
+          <a:prstGeom prst="rect">
+            <a:avLst/>
+          </a:prstGeom>
+        </p:spPr>
+        <p:style>
+          <a:lnRef idx="2">
+            <a:schemeClr val="accent3"/>
+          </a:lnRef>
+          <a:fillRef idx="1">
+            <a:schemeClr val="lt1"/>
+          </a:fillRef>
+          <a:effectRef idx="0">
+            <a:schemeClr val="accent3"/>
+          </a:effectRef>
+          <a:fontRef idx="minor">
+            <a:schemeClr val="dk1"/>
+          </a:fontRef>
+        </p:style>
+      </p:pic>
+      <p:sp>
+        <p:nvSpPr>
+          <p:cNvPr id="91" name="AutoShape 40" descr="Image result for database"/>
+          <p:cNvSpPr>
+            <a:spLocks noChangeAspect="1" noChangeArrowheads="1"/>
+          </p:cNvSpPr>
+          <p:nvPr/>
+        </p:nvSpPr>
+        <p:spPr bwMode="auto">
+          <a:xfrm>
+            <a:off x="1679575" y="1379537"/>
+            <a:ext cx="304800" cy="304801"/>
+          </a:xfrm>
+          <a:prstGeom prst="rect">
+            <a:avLst/>
+          </a:prstGeom>
+          <a:noFill/>
+          <a:extLst>
+            <a:ext uri="{909E8E84-426E-40DD-AFC4-6F175D3DCCD1}">
+              <a14:hiddenFill xmlns:a14="http://schemas.microsoft.com/office/drawing/2010/main">
+                <a:solidFill>
+                  <a:srgbClr val="FFFFFF"/>
+                </a:solidFill>
+              </a14:hiddenFill>
+            </a:ext>
+          </a:extLst>
+        </p:spPr>
+        <p:txBody>
+          <a:bodyPr vert="horz" wrap="square" lIns="91440" tIns="45720" rIns="91440" bIns="45720" numCol="1" anchor="t" anchorCtr="0" compatLnSpc="1">
+            <a:prstTxWarp prst="textNoShape">
+              <a:avLst/>
+            </a:prstTxWarp>
+          </a:bodyPr>
+          <a:lstStyle/>
+          <a:p>
+            <a:endParaRPr lang="en-GB"/>
+          </a:p>
+        </p:txBody>
+      </p:sp>
+      <p:sp>
+        <p:nvSpPr>
+          <p:cNvPr id="92" name="AutoShape 42" descr="Image result for database"/>
+          <p:cNvSpPr>
+            <a:spLocks noChangeAspect="1" noChangeArrowheads="1"/>
+          </p:cNvSpPr>
+          <p:nvPr/>
+        </p:nvSpPr>
+        <p:spPr bwMode="auto">
+          <a:xfrm>
+            <a:off x="1831975" y="1531937"/>
+            <a:ext cx="304800" cy="304801"/>
+          </a:xfrm>
+          <a:prstGeom prst="rect">
+            <a:avLst/>
+          </a:prstGeom>
+          <a:noFill/>
+          <a:extLst>
+            <a:ext uri="{909E8E84-426E-40DD-AFC4-6F175D3DCCD1}">
+              <a14:hiddenFill xmlns:a14="http://schemas.microsoft.com/office/drawing/2010/main">
+                <a:solidFill>
+                  <a:srgbClr val="FFFFFF"/>
+                </a:solidFill>
+              </a14:hiddenFill>
+            </a:ext>
+          </a:extLst>
+        </p:spPr>
+        <p:txBody>
+          <a:bodyPr vert="horz" wrap="square" lIns="91440" tIns="45720" rIns="91440" bIns="45720" numCol="1" anchor="t" anchorCtr="0" compatLnSpc="1">
+            <a:prstTxWarp prst="textNoShape">
+              <a:avLst/>
+            </a:prstTxWarp>
+          </a:bodyPr>
+          <a:lstStyle/>
+          <a:p>
+            <a:endParaRPr lang="en-GB"/>
+          </a:p>
+        </p:txBody>
+      </p:sp>
+      <p:cxnSp>
+        <p:nvCxnSpPr>
+          <p:cNvPr id="100" name="Straight Arrow Connector 99"/>
+          <p:cNvCxnSpPr>
+            <a:stCxn id="3092" idx="3"/>
+            <a:endCxn id="5" idx="1"/>
+          </p:cNvCxnSpPr>
+          <p:nvPr/>
+        </p:nvCxnSpPr>
+        <p:spPr>
+          <a:xfrm flipV="1">
+            <a:off x="1777995" y="2343150"/>
+            <a:ext cx="1317423" cy="309138"/>
+          </a:xfrm>
+          <a:prstGeom prst="straightConnector1">
+            <a:avLst/>
+          </a:prstGeom>
+          <a:ln>
+            <a:headEnd type="arrow"/>
+            <a:tailEnd type="arrow"/>
+          </a:ln>
+        </p:spPr>
+        <p:style>
+          <a:lnRef idx="1">
+            <a:schemeClr val="accent1"/>
+          </a:lnRef>
+          <a:fillRef idx="0">
+            <a:schemeClr val="accent1"/>
+          </a:fillRef>
+          <a:effectRef idx="0">
+            <a:schemeClr val="accent1"/>
+          </a:effectRef>
+          <a:fontRef idx="minor">
+            <a:schemeClr val="tx1"/>
+          </a:fontRef>
+        </p:style>
+      </p:cxnSp>
+      <p:cxnSp>
+        <p:nvCxnSpPr>
+          <p:cNvPr id="111" name="Straight Arrow Connector 110"/>
+          <p:cNvCxnSpPr>
+            <a:stCxn id="3096" idx="3"/>
+            <a:endCxn id="5" idx="1"/>
+          </p:cNvCxnSpPr>
+          <p:nvPr/>
+        </p:nvCxnSpPr>
+        <p:spPr>
+          <a:xfrm flipV="1">
+            <a:off x="1806573" y="2343150"/>
+            <a:ext cx="1288845" cy="1222398"/>
+          </a:xfrm>
+          <a:prstGeom prst="straightConnector1">
+            <a:avLst/>
+          </a:prstGeom>
+          <a:ln>
+            <a:headEnd type="arrow"/>
+            <a:tailEnd type="arrow"/>
+          </a:ln>
+        </p:spPr>
+        <p:style>
+          <a:lnRef idx="1">
+            <a:schemeClr val="accent1"/>
+          </a:lnRef>
+          <a:fillRef idx="0">
+            <a:schemeClr val="accent1"/>
+          </a:fillRef>
+          <a:effectRef idx="0">
+            <a:schemeClr val="accent1"/>
+          </a:effectRef>
+          <a:fontRef idx="minor">
+            <a:schemeClr val="tx1"/>
+          </a:fontRef>
+        </p:style>
+      </p:cxnSp>
+      <p:cxnSp>
+        <p:nvCxnSpPr>
+          <p:cNvPr id="104" name="Straight Arrow Connector 103"/>
+          <p:cNvCxnSpPr>
+            <a:stCxn id="11" idx="1"/>
+            <a:endCxn id="3094" idx="3"/>
+          </p:cNvCxnSpPr>
+          <p:nvPr/>
+        </p:nvCxnSpPr>
+        <p:spPr>
+          <a:xfrm flipH="1">
+            <a:off x="1835822" y="4388239"/>
+            <a:ext cx="1284996" cy="483794"/>
+          </a:xfrm>
+          <a:prstGeom prst="straightConnector1">
+            <a:avLst/>
+          </a:prstGeom>
+          <a:ln>
+            <a:headEnd type="arrow"/>
+            <a:tailEnd type="arrow"/>
+          </a:ln>
+        </p:spPr>
+        <p:style>
+          <a:lnRef idx="1">
+            <a:schemeClr val="accent1"/>
+          </a:lnRef>
+          <a:fillRef idx="0">
+            <a:schemeClr val="accent1"/>
+          </a:fillRef>
+          <a:effectRef idx="0">
+            <a:schemeClr val="accent1"/>
+          </a:effectRef>
+          <a:fontRef idx="minor">
+            <a:schemeClr val="tx1"/>
+          </a:fontRef>
+        </p:style>
+      </p:cxnSp>
+      <p:cxnSp>
+        <p:nvCxnSpPr>
+          <p:cNvPr id="106" name="Straight Arrow Connector 105"/>
+          <p:cNvCxnSpPr>
+            <a:stCxn id="5" idx="1"/>
+            <a:endCxn id="3094" idx="3"/>
+          </p:cNvCxnSpPr>
+          <p:nvPr/>
+        </p:nvCxnSpPr>
+        <p:spPr>
+          <a:xfrm flipH="1">
+            <a:off x="1835822" y="2343150"/>
+            <a:ext cx="1259596" cy="2528883"/>
+          </a:xfrm>
+          <a:prstGeom prst="straightConnector1">
+            <a:avLst/>
+          </a:prstGeom>
+          <a:ln>
+            <a:headEnd type="arrow"/>
+            <a:tailEnd type="arrow"/>
+          </a:ln>
+        </p:spPr>
+        <p:style>
+          <a:lnRef idx="1">
+            <a:schemeClr val="accent1"/>
+          </a:lnRef>
+          <a:fillRef idx="0">
+            <a:schemeClr val="accent1"/>
+          </a:fillRef>
+          <a:effectRef idx="0">
+            <a:schemeClr val="accent1"/>
+          </a:effectRef>
+          <a:fontRef idx="minor">
+            <a:schemeClr val="tx1"/>
+          </a:fontRef>
+        </p:style>
+      </p:cxnSp>
+      <p:cxnSp>
+        <p:nvCxnSpPr>
+          <p:cNvPr id="109" name="Straight Arrow Connector 108"/>
+          <p:cNvCxnSpPr>
+            <a:stCxn id="5" idx="3"/>
+            <a:endCxn id="6" idx="2"/>
+          </p:cNvCxnSpPr>
+          <p:nvPr/>
+        </p:nvCxnSpPr>
+        <p:spPr>
+          <a:xfrm>
+            <a:off x="4505118" y="2343150"/>
+            <a:ext cx="1057482" cy="309139"/>
+          </a:xfrm>
+          <a:prstGeom prst="straightConnector1">
+            <a:avLst/>
+          </a:prstGeom>
+          <a:ln>
+            <a:headEnd type="arrow"/>
+            <a:tailEnd type="arrow"/>
+          </a:ln>
+        </p:spPr>
+        <p:style>
+          <a:lnRef idx="1">
+            <a:schemeClr val="accent1"/>
+          </a:lnRef>
+          <a:fillRef idx="0">
+            <a:schemeClr val="accent1"/>
+          </a:fillRef>
+          <a:effectRef idx="0">
+            <a:schemeClr val="accent1"/>
+          </a:effectRef>
+          <a:fontRef idx="minor">
+            <a:schemeClr val="tx1"/>
+          </a:fontRef>
+        </p:style>
+      </p:cxnSp>
+      <p:cxnSp>
+        <p:nvCxnSpPr>
+          <p:cNvPr id="115" name="Straight Arrow Connector 114"/>
+          <p:cNvCxnSpPr>
+            <a:stCxn id="6" idx="2"/>
+            <a:endCxn id="11" idx="3"/>
+          </p:cNvCxnSpPr>
+          <p:nvPr/>
+        </p:nvCxnSpPr>
+        <p:spPr>
+          <a:xfrm flipH="1">
+            <a:off x="4530518" y="2652289"/>
+            <a:ext cx="1032082" cy="1735950"/>
+          </a:xfrm>
+          <a:prstGeom prst="straightConnector1">
+            <a:avLst/>
+          </a:prstGeom>
+          <a:ln>
+            <a:headEnd type="arrow"/>
+            <a:tailEnd type="arrow"/>
+          </a:ln>
+        </p:spPr>
+        <p:style>
+          <a:lnRef idx="1">
+            <a:schemeClr val="accent1"/>
+          </a:lnRef>
+          <a:fillRef idx="0">
+            <a:schemeClr val="accent1"/>
+          </a:fillRef>
+          <a:effectRef idx="0">
+            <a:schemeClr val="accent1"/>
+          </a:effectRef>
+          <a:fontRef idx="minor">
+            <a:schemeClr val="tx1"/>
+          </a:fontRef>
+        </p:style>
+      </p:cxnSp>
+      <p:cxnSp>
+        <p:nvCxnSpPr>
+          <p:cNvPr id="117" name="Straight Arrow Connector 116"/>
+          <p:cNvCxnSpPr>
+            <a:stCxn id="11" idx="1"/>
+            <a:endCxn id="3092" idx="3"/>
+          </p:cNvCxnSpPr>
+          <p:nvPr/>
+        </p:nvCxnSpPr>
+        <p:spPr>
+          <a:xfrm flipH="1" flipV="1">
+            <a:off x="1777995" y="2652288"/>
+            <a:ext cx="1342823" cy="1735951"/>
+          </a:xfrm>
+          <a:prstGeom prst="straightConnector1">
+            <a:avLst/>
+          </a:prstGeom>
+          <a:ln>
+            <a:headEnd type="arrow"/>
+            <a:tailEnd type="arrow"/>
+          </a:ln>
+        </p:spPr>
+        <p:style>
+          <a:lnRef idx="1">
+            <a:schemeClr val="accent1"/>
+          </a:lnRef>
+          <a:fillRef idx="0">
+            <a:schemeClr val="accent1"/>
+          </a:fillRef>
+          <a:effectRef idx="0">
+            <a:schemeClr val="accent1"/>
+          </a:effectRef>
+          <a:fontRef idx="minor">
+            <a:schemeClr val="tx1"/>
+          </a:fontRef>
+        </p:style>
+      </p:cxnSp>
+      <p:cxnSp>
+        <p:nvCxnSpPr>
+          <p:cNvPr id="119" name="Straight Arrow Connector 118"/>
+          <p:cNvCxnSpPr>
+            <a:stCxn id="99" idx="0"/>
+            <a:endCxn id="6" idx="4"/>
+          </p:cNvCxnSpPr>
+          <p:nvPr/>
+        </p:nvCxnSpPr>
+        <p:spPr>
+          <a:xfrm flipV="1">
+            <a:off x="6942041" y="3147589"/>
+            <a:ext cx="68359" cy="751304"/>
+          </a:xfrm>
+          <a:prstGeom prst="straightConnector1">
+            <a:avLst/>
+          </a:prstGeom>
+          <a:ln>
+            <a:headEnd type="arrow"/>
+            <a:tailEnd type="arrow"/>
+          </a:ln>
+        </p:spPr>
+        <p:style>
+          <a:lnRef idx="1">
+            <a:schemeClr val="accent1"/>
+          </a:lnRef>
+          <a:fillRef idx="0">
+            <a:schemeClr val="accent1"/>
+          </a:fillRef>
+          <a:effectRef idx="0">
+            <a:schemeClr val="accent1"/>
+          </a:effectRef>
+          <a:fontRef idx="minor">
+            <a:schemeClr val="tx1"/>
+          </a:fontRef>
+        </p:style>
+      </p:cxnSp>
+      <p:pic>
+        <p:nvPicPr>
+          <p:cNvPr id="3116" name="Picture 44" descr="Related image"/>
+          <p:cNvPicPr>
+            <a:picLocks noChangeAspect="1" noChangeArrowheads="1"/>
+          </p:cNvPicPr>
+          <p:nvPr/>
+        </p:nvPicPr>
+        <p:blipFill>
+          <a:blip r:embed="rId8">
+            <a:extLst>
+              <a:ext uri="{28A0092B-C50C-407E-A947-70E740481C1C}">
+                <a14:useLocalDpi xmlns:a14="http://schemas.microsoft.com/office/drawing/2010/main" val="0"/>
+              </a:ext>
+            </a:extLst>
+          </a:blip>
+          <a:srcRect/>
+          <a:stretch>
+            <a:fillRect/>
+          </a:stretch>
+        </p:blipFill>
+        <p:spPr bwMode="auto">
+          <a:xfrm>
+            <a:off x="8202077" y="3769677"/>
+            <a:ext cx="695633" cy="795010"/>
+          </a:xfrm>
+          <a:prstGeom prst="rect">
+            <a:avLst/>
+          </a:prstGeom>
+          <a:noFill/>
+          <a:extLst>
+            <a:ext uri="{909E8E84-426E-40DD-AFC4-6F175D3DCCD1}">
+              <a14:hiddenFill xmlns:a14="http://schemas.microsoft.com/office/drawing/2010/main">
+                <a:solidFill>
+                  <a:srgbClr val="FFFFFF"/>
+                </a:solidFill>
+              </a14:hiddenFill>
+            </a:ext>
+          </a:extLst>
+        </p:spPr>
+      </p:pic>
+      <p:sp>
+        <p:nvSpPr>
+          <p:cNvPr id="3075" name="Left-Right Arrow 3074"/>
+          <p:cNvSpPr/>
+          <p:nvPr/>
+        </p:nvSpPr>
+        <p:spPr>
+          <a:xfrm>
+            <a:off x="7368982" y="3898893"/>
+            <a:ext cx="833095" cy="538161"/>
+          </a:xfrm>
+          <a:prstGeom prst="leftRightArrow">
+            <a:avLst/>
+          </a:prstGeom>
+        </p:spPr>
+        <p:style>
+          <a:lnRef idx="2">
+            <a:schemeClr val="accent1">
+              <a:shade val="50000"/>
+            </a:schemeClr>
+          </a:lnRef>
+          <a:fillRef idx="1">
+            <a:schemeClr val="accent1"/>
+          </a:fillRef>
+          <a:effectRef idx="0">
+            <a:schemeClr val="accent1"/>
+          </a:effectRef>
+          <a:fontRef idx="minor">
+            <a:schemeClr val="lt1"/>
+          </a:fontRef>
+        </p:style>
+        <p:txBody>
+          <a:bodyPr rtlCol="0" anchor="ctr"/>
+          <a:lstStyle/>
+          <a:p>
+            <a:pPr algn="ctr"/>
+            <a:endParaRPr lang="en-GB"/>
+          </a:p>
+        </p:txBody>
+      </p:sp>
+      <p:sp>
+        <p:nvSpPr>
+          <p:cNvPr id="3076" name="Rectangle 3075"/>
+          <p:cNvSpPr/>
+          <p:nvPr/>
+        </p:nvSpPr>
+        <p:spPr>
+          <a:xfrm>
+            <a:off x="5118374" y="3212293"/>
+            <a:ext cx="1143000" cy="500078"/>
+          </a:xfrm>
+          <a:prstGeom prst="rect">
+            <a:avLst/>
+          </a:prstGeom>
+        </p:spPr>
+        <p:style>
+          <a:lnRef idx="2">
+            <a:schemeClr val="accent1">
+              <a:shade val="50000"/>
+            </a:schemeClr>
+          </a:lnRef>
+          <a:fillRef idx="1">
+            <a:schemeClr val="accent1"/>
+          </a:fillRef>
+          <a:effectRef idx="0">
+            <a:schemeClr val="accent1"/>
+          </a:effectRef>
+          <a:fontRef idx="minor">
+            <a:schemeClr val="lt1"/>
+          </a:fontRef>
+        </p:style>
+        <p:txBody>
+          <a:bodyPr rtlCol="0" anchor="ctr"/>
+          <a:lstStyle/>
+          <a:p>
+            <a:pPr algn="ctr"/>
+            <a:r>
+              <a:rPr lang="en-US" sz="2800" dirty="0" smtClean="0"/>
+              <a:t>DATA</a:t>
+            </a:r>
+            <a:endParaRPr lang="en-GB" sz="2800" dirty="0"/>
           </a:p>
         </p:txBody>
       </p:sp>
     </p:spTree>
     <p:extLst>
       <p:ext uri="{BB962C8B-B14F-4D97-AF65-F5344CB8AC3E}">
-        <p14:creationId xmlns:p14="http://schemas.microsoft.com/office/powerpoint/2010/main" val="3135697864"/>
+        <p14:creationId xmlns:p14="http://schemas.microsoft.com/office/powerpoint/2010/main" val="3830390554"/>
       </p:ext>
     </p:extLst>
   </p:cSld>
   <p:clrMapOvr>
     <a:masterClrMapping/>
   </p:clrMapOvr>
-  <p:timing>
-    <p:tnLst>
-      <p:par>
-        <p:cTn id="1" dur="indefinite" restart="never" nodeType="tmRoot"/>
-      </p:par>
-    </p:tnLst>
-  </p:timing>
 </p:sld>
 </file>
 
@@ -5215,8 +6923,35 @@
           <a:lstStyle/>
           <a:p>
             <a:r>
-              <a:rPr lang="en-US" dirty="0" err="1" smtClean="0"/>
-              <a:t>Đặt</a:t>
+              <a:rPr lang="en-US" dirty="0" smtClean="0"/>
+              <a:t>Service</a:t>
+            </a:r>
+            <a:endParaRPr lang="en-US" dirty="0"/>
+          </a:p>
+        </p:txBody>
+      </p:sp>
+      <p:sp>
+        <p:nvSpPr>
+          <p:cNvPr id="3" name="Content Placeholder 2"/>
+          <p:cNvSpPr>
+            <a:spLocks noGrp="1"/>
+          </p:cNvSpPr>
+          <p:nvPr>
+            <p:ph idx="1"/>
+          </p:nvPr>
+        </p:nvSpPr>
+        <p:spPr/>
+        <p:txBody>
+          <a:bodyPr/>
+          <a:lstStyle/>
+          <a:p>
+            <a:r>
+              <a:rPr lang="en-US" dirty="0" smtClean="0"/>
+              <a:t>Chia </a:t>
+            </a:r>
+            <a:r>
+              <a:rPr lang="en-US" dirty="0" err="1" smtClean="0"/>
+              <a:t>sẻ</a:t>
             </a:r>
             <a:r>
               <a:rPr lang="en-US" dirty="0" smtClean="0"/>
@@ -5224,7 +6959,15 @@
             </a:r>
             <a:r>
               <a:rPr lang="en-US" dirty="0" err="1" smtClean="0"/>
-              <a:t>vấn</a:t>
+              <a:t>thông</a:t>
+            </a:r>
+            <a:r>
+              <a:rPr lang="en-US" dirty="0" smtClean="0"/>
+              <a:t> tin </a:t>
+            </a:r>
+            <a:r>
+              <a:rPr lang="en-US" dirty="0" err="1" smtClean="0"/>
+              <a:t>giữa</a:t>
             </a:r>
             <a:r>
               <a:rPr lang="en-US" dirty="0" smtClean="0"/>
@@ -5232,439 +6975,109 @@
             </a:r>
             <a:r>
               <a:rPr lang="en-US" dirty="0" err="1" smtClean="0"/>
-              <a:t>đề</a:t>
-            </a:r>
-            <a:endParaRPr lang="en-US" dirty="0"/>
-          </a:p>
-        </p:txBody>
-      </p:sp>
-      <p:pic>
-        <p:nvPicPr>
-          <p:cNvPr id="2050" name="Picture 2" descr="Image result for pc"/>
-          <p:cNvPicPr>
-            <a:picLocks noChangeAspect="1" noChangeArrowheads="1"/>
-          </p:cNvPicPr>
-          <p:nvPr/>
-        </p:nvPicPr>
-        <p:blipFill>
-          <a:blip r:embed="rId2" cstate="print">
-            <a:extLst>
-              <a:ext uri="{28A0092B-C50C-407E-A947-70E740481C1C}">
-                <a14:useLocalDpi xmlns:a14="http://schemas.microsoft.com/office/drawing/2010/main" val="0"/>
-              </a:ext>
-            </a:extLst>
-          </a:blip>
-          <a:srcRect/>
-          <a:stretch>
-            <a:fillRect/>
-          </a:stretch>
-        </p:blipFill>
-        <p:spPr bwMode="auto">
-          <a:xfrm>
-            <a:off x="533400" y="1905000"/>
-            <a:ext cx="2283475" cy="1713602"/>
-          </a:xfrm>
-          <a:prstGeom prst="rect">
-            <a:avLst/>
-          </a:prstGeom>
-          <a:extLst/>
-        </p:spPr>
-        <p:style>
-          <a:lnRef idx="2">
-            <a:schemeClr val="accent1"/>
-          </a:lnRef>
-          <a:fillRef idx="1">
-            <a:schemeClr val="lt1"/>
-          </a:fillRef>
-          <a:effectRef idx="0">
-            <a:schemeClr val="accent1"/>
-          </a:effectRef>
-          <a:fontRef idx="minor">
-            <a:schemeClr val="dk1"/>
-          </a:fontRef>
-        </p:style>
-      </p:pic>
-      <p:pic>
-        <p:nvPicPr>
-          <p:cNvPr id="2052" name="Picture 4" descr="Image result for cloud internet"/>
-          <p:cNvPicPr>
-            <a:picLocks noChangeAspect="1" noChangeArrowheads="1"/>
-          </p:cNvPicPr>
-          <p:nvPr/>
-        </p:nvPicPr>
-        <p:blipFill>
-          <a:blip r:embed="rId3" cstate="print">
-            <a:extLst>
-              <a:ext uri="{28A0092B-C50C-407E-A947-70E740481C1C}">
-                <a14:useLocalDpi xmlns:a14="http://schemas.microsoft.com/office/drawing/2010/main" val="0"/>
-              </a:ext>
-            </a:extLst>
-          </a:blip>
-          <a:srcRect/>
-          <a:stretch>
-            <a:fillRect/>
-          </a:stretch>
-        </p:blipFill>
-        <p:spPr bwMode="auto">
-          <a:xfrm>
-            <a:off x="4038600" y="2085758"/>
-            <a:ext cx="1544267" cy="1209676"/>
-          </a:xfrm>
-          <a:prstGeom prst="rect">
-            <a:avLst/>
-          </a:prstGeom>
-          <a:noFill/>
-          <a:extLst>
-            <a:ext uri="{909E8E84-426E-40DD-AFC4-6F175D3DCCD1}">
-              <a14:hiddenFill xmlns:a14="http://schemas.microsoft.com/office/drawing/2010/main">
-                <a:solidFill>
-                  <a:srgbClr val="FFFFFF"/>
-                </a:solidFill>
-              </a14:hiddenFill>
-            </a:ext>
-          </a:extLst>
-        </p:spPr>
-      </p:pic>
-      <p:sp>
-        <p:nvSpPr>
-          <p:cNvPr id="3" name="Right Arrow 2"/>
-          <p:cNvSpPr/>
-          <p:nvPr/>
-        </p:nvSpPr>
-        <p:spPr>
-          <a:xfrm>
-            <a:off x="3048000" y="2338387"/>
-            <a:ext cx="916925" cy="318639"/>
-          </a:xfrm>
-          <a:prstGeom prst="rightArrow">
-            <a:avLst/>
-          </a:prstGeom>
-        </p:spPr>
-        <p:style>
-          <a:lnRef idx="2">
-            <a:schemeClr val="accent1">
-              <a:shade val="50000"/>
-            </a:schemeClr>
-          </a:lnRef>
-          <a:fillRef idx="1">
-            <a:schemeClr val="accent1"/>
-          </a:fillRef>
-          <a:effectRef idx="0">
-            <a:schemeClr val="accent1"/>
-          </a:effectRef>
-          <a:fontRef idx="minor">
-            <a:schemeClr val="lt1"/>
-          </a:fontRef>
-        </p:style>
-        <p:txBody>
-          <a:bodyPr rtlCol="0" anchor="ctr"/>
-          <a:lstStyle/>
-          <a:p>
-            <a:pPr algn="ctr"/>
-            <a:endParaRPr lang="en-US"/>
-          </a:p>
-        </p:txBody>
-      </p:sp>
-      <p:sp>
-        <p:nvSpPr>
-          <p:cNvPr id="7" name="Right Arrow 6"/>
-          <p:cNvSpPr/>
-          <p:nvPr/>
-        </p:nvSpPr>
-        <p:spPr>
-          <a:xfrm>
-            <a:off x="5582867" y="2338388"/>
-            <a:ext cx="916925" cy="318639"/>
-          </a:xfrm>
-          <a:prstGeom prst="rightArrow">
-            <a:avLst/>
-          </a:prstGeom>
-        </p:spPr>
-        <p:style>
-          <a:lnRef idx="2">
-            <a:schemeClr val="accent1">
-              <a:shade val="50000"/>
-            </a:schemeClr>
-          </a:lnRef>
-          <a:fillRef idx="1">
-            <a:schemeClr val="accent1"/>
-          </a:fillRef>
-          <a:effectRef idx="0">
-            <a:schemeClr val="accent1"/>
-          </a:effectRef>
-          <a:fontRef idx="minor">
-            <a:schemeClr val="lt1"/>
-          </a:fontRef>
-        </p:style>
-        <p:txBody>
-          <a:bodyPr rtlCol="0" anchor="ctr"/>
-          <a:lstStyle/>
-          <a:p>
-            <a:pPr algn="ctr"/>
-            <a:endParaRPr lang="en-US"/>
-          </a:p>
-        </p:txBody>
-      </p:sp>
-      <p:sp>
-        <p:nvSpPr>
-          <p:cNvPr id="9" name="Right Arrow 8"/>
-          <p:cNvSpPr/>
-          <p:nvPr/>
-        </p:nvSpPr>
-        <p:spPr>
-          <a:xfrm rot="10800000">
-            <a:off x="3048000" y="2857862"/>
-            <a:ext cx="916925" cy="318639"/>
-          </a:xfrm>
-          <a:prstGeom prst="rightArrow">
-            <a:avLst/>
-          </a:prstGeom>
-        </p:spPr>
-        <p:style>
-          <a:lnRef idx="2">
-            <a:schemeClr val="accent1">
-              <a:shade val="50000"/>
-            </a:schemeClr>
-          </a:lnRef>
-          <a:fillRef idx="1">
-            <a:schemeClr val="accent1"/>
-          </a:fillRef>
-          <a:effectRef idx="0">
-            <a:schemeClr val="accent1"/>
-          </a:effectRef>
-          <a:fontRef idx="minor">
-            <a:schemeClr val="lt1"/>
-          </a:fontRef>
-        </p:style>
-        <p:txBody>
-          <a:bodyPr rtlCol="0" anchor="ctr"/>
-          <a:lstStyle/>
-          <a:p>
-            <a:pPr algn="ctr"/>
-            <a:endParaRPr lang="en-US"/>
-          </a:p>
-        </p:txBody>
-      </p:sp>
-      <p:sp>
-        <p:nvSpPr>
-          <p:cNvPr id="10" name="Right Arrow 9"/>
-          <p:cNvSpPr/>
-          <p:nvPr/>
-        </p:nvSpPr>
-        <p:spPr>
-          <a:xfrm rot="10800000">
-            <a:off x="5595567" y="2846060"/>
-            <a:ext cx="916925" cy="318639"/>
-          </a:xfrm>
-          <a:prstGeom prst="rightArrow">
-            <a:avLst/>
-          </a:prstGeom>
-        </p:spPr>
-        <p:style>
-          <a:lnRef idx="2">
-            <a:schemeClr val="accent1">
-              <a:shade val="50000"/>
-            </a:schemeClr>
-          </a:lnRef>
-          <a:fillRef idx="1">
-            <a:schemeClr val="accent1"/>
-          </a:fillRef>
-          <a:effectRef idx="0">
-            <a:schemeClr val="accent1"/>
-          </a:effectRef>
-          <a:fontRef idx="minor">
-            <a:schemeClr val="lt1"/>
-          </a:fontRef>
-        </p:style>
-        <p:txBody>
-          <a:bodyPr rtlCol="0" anchor="ctr"/>
-          <a:lstStyle/>
-          <a:p>
-            <a:pPr algn="ctr"/>
-            <a:endParaRPr lang="en-US"/>
-          </a:p>
-        </p:txBody>
-      </p:sp>
-      <p:pic>
-        <p:nvPicPr>
-          <p:cNvPr id="12" name="Picture 6" descr="https://scontent.fhan5-5.fna.fbcdn.net/v/t1.15752-9/34321862_1243292122473760_5429512198915358720_n.png?_nc_cat=0&amp;oh=df88a9b28bf6a41448b15961b01966e1&amp;oe=5B82613D"/>
-          <p:cNvPicPr>
-            <a:picLocks noChangeAspect="1" noChangeArrowheads="1"/>
-          </p:cNvPicPr>
-          <p:nvPr/>
-        </p:nvPicPr>
-        <p:blipFill>
-          <a:blip r:embed="rId4" cstate="print">
-            <a:extLst>
-              <a:ext uri="{28A0092B-C50C-407E-A947-70E740481C1C}">
-                <a14:useLocalDpi xmlns:a14="http://schemas.microsoft.com/office/drawing/2010/main" val="0"/>
-              </a:ext>
-            </a:extLst>
-          </a:blip>
-          <a:srcRect/>
-          <a:stretch>
-            <a:fillRect/>
-          </a:stretch>
-        </p:blipFill>
-        <p:spPr bwMode="auto">
-          <a:xfrm>
-            <a:off x="1607708" y="2529993"/>
-            <a:ext cx="1016936" cy="1807886"/>
-          </a:xfrm>
-          <a:prstGeom prst="rect">
-            <a:avLst/>
-          </a:prstGeom>
-          <a:noFill/>
-          <a:extLst>
-            <a:ext uri="{909E8E84-426E-40DD-AFC4-6F175D3DCCD1}">
-              <a14:hiddenFill xmlns:a14="http://schemas.microsoft.com/office/drawing/2010/main">
-                <a:solidFill>
-                  <a:srgbClr val="FFFFFF"/>
-                </a:solidFill>
-              </a14:hiddenFill>
-            </a:ext>
-          </a:extLst>
-        </p:spPr>
-      </p:pic>
-      <p:sp>
-        <p:nvSpPr>
-          <p:cNvPr id="6" name="TextBox 5"/>
-          <p:cNvSpPr txBox="1"/>
-          <p:nvPr/>
-        </p:nvSpPr>
-        <p:spPr>
-          <a:xfrm>
-            <a:off x="4083550" y="1604038"/>
-            <a:ext cx="1512017" cy="369332"/>
-          </a:xfrm>
-          <a:prstGeom prst="rect">
-            <a:avLst/>
-          </a:prstGeom>
-        </p:spPr>
-        <p:style>
-          <a:lnRef idx="2">
-            <a:schemeClr val="accent3"/>
-          </a:lnRef>
-          <a:fillRef idx="1">
-            <a:schemeClr val="lt1"/>
-          </a:fillRef>
-          <a:effectRef idx="0">
-            <a:schemeClr val="accent3"/>
-          </a:effectRef>
-          <a:fontRef idx="minor">
-            <a:schemeClr val="dk1"/>
-          </a:fontRef>
-        </p:style>
-        <p:txBody>
-          <a:bodyPr wrap="none" rtlCol="0">
-            <a:spAutoFit/>
-          </a:bodyPr>
-          <a:lstStyle/>
-          <a:p>
-            <a:r>
-              <a:rPr lang="en-US" dirty="0" smtClean="0"/>
-              <a:t>HTTP Protocol</a:t>
-            </a:r>
-            <a:endParaRPr lang="en-US" dirty="0"/>
-          </a:p>
-        </p:txBody>
-      </p:sp>
-      <p:pic>
-        <p:nvPicPr>
-          <p:cNvPr id="1026" name="Picture 2" descr="Image result for database"/>
-          <p:cNvPicPr>
-            <a:picLocks noChangeAspect="1" noChangeArrowheads="1"/>
-          </p:cNvPicPr>
-          <p:nvPr/>
-        </p:nvPicPr>
-        <p:blipFill>
-          <a:blip r:embed="rId5">
-            <a:extLst>
-              <a:ext uri="{28A0092B-C50C-407E-A947-70E740481C1C}">
-                <a14:useLocalDpi xmlns:a14="http://schemas.microsoft.com/office/drawing/2010/main" val="0"/>
-              </a:ext>
-            </a:extLst>
-          </a:blip>
-          <a:srcRect/>
-          <a:stretch>
-            <a:fillRect/>
-          </a:stretch>
-        </p:blipFill>
-        <p:spPr bwMode="auto">
-          <a:xfrm>
-            <a:off x="6512492" y="1738096"/>
-            <a:ext cx="1905000" cy="1905000"/>
-          </a:xfrm>
-          <a:prstGeom prst="rect">
-            <a:avLst/>
-          </a:prstGeom>
-          <a:noFill/>
-          <a:extLst>
-            <a:ext uri="{909E8E84-426E-40DD-AFC4-6F175D3DCCD1}">
-              <a14:hiddenFill xmlns:a14="http://schemas.microsoft.com/office/drawing/2010/main">
-                <a:solidFill>
-                  <a:srgbClr val="FFFFFF"/>
-                </a:solidFill>
-              </a14:hiddenFill>
-            </a:ext>
-          </a:extLst>
-        </p:spPr>
-      </p:pic>
-      <p:sp>
-        <p:nvSpPr>
-          <p:cNvPr id="8" name="TextBox 7"/>
-          <p:cNvSpPr txBox="1"/>
-          <p:nvPr/>
-        </p:nvSpPr>
-        <p:spPr>
-          <a:xfrm>
-            <a:off x="5667896" y="3176502"/>
-            <a:ext cx="1107508" cy="369332"/>
-          </a:xfrm>
-          <a:prstGeom prst="rect">
-            <a:avLst/>
-          </a:prstGeom>
-          <a:noFill/>
-        </p:spPr>
-        <p:txBody>
-          <a:bodyPr wrap="square" rtlCol="0">
-            <a:spAutoFit/>
-          </a:bodyPr>
-          <a:lstStyle/>
-          <a:p>
-            <a:r>
-              <a:rPr lang="en-US" dirty="0" smtClean="0"/>
-              <a:t>DATA</a:t>
-            </a:r>
-            <a:endParaRPr lang="en-US" dirty="0"/>
-          </a:p>
-        </p:txBody>
-      </p:sp>
-      <p:sp>
-        <p:nvSpPr>
-          <p:cNvPr id="16" name="TextBox 15"/>
-          <p:cNvSpPr txBox="1"/>
-          <p:nvPr/>
-        </p:nvSpPr>
-        <p:spPr>
-          <a:xfrm>
-            <a:off x="3200400" y="3249270"/>
-            <a:ext cx="1107508" cy="369332"/>
-          </a:xfrm>
-          <a:prstGeom prst="rect">
-            <a:avLst/>
-          </a:prstGeom>
-          <a:noFill/>
-        </p:spPr>
-        <p:txBody>
-          <a:bodyPr wrap="square" rtlCol="0">
-            <a:spAutoFit/>
-          </a:bodyPr>
-          <a:lstStyle/>
-          <a:p>
-            <a:r>
-              <a:rPr lang="en-US" dirty="0" smtClean="0"/>
-              <a:t>DATA</a:t>
+              <a:t>các</a:t>
+            </a:r>
+            <a:r>
+              <a:rPr lang="en-US" dirty="0" smtClean="0"/>
+              <a:t> </a:t>
+            </a:r>
+            <a:r>
+              <a:rPr lang="en-US" dirty="0" err="1" smtClean="0"/>
+              <a:t>nền</a:t>
+            </a:r>
+            <a:r>
+              <a:rPr lang="en-US" dirty="0" smtClean="0"/>
+              <a:t> </a:t>
+            </a:r>
+            <a:r>
+              <a:rPr lang="en-US" dirty="0" err="1" smtClean="0"/>
+              <a:t>tảng</a:t>
+            </a:r>
+            <a:endParaRPr lang="en-US" dirty="0" smtClean="0"/>
+          </a:p>
+          <a:p>
+            <a:r>
+              <a:rPr lang="en-US" dirty="0" err="1" smtClean="0"/>
+              <a:t>Xóa</a:t>
+            </a:r>
+            <a:r>
+              <a:rPr lang="en-US" dirty="0" smtClean="0"/>
+              <a:t> </a:t>
+            </a:r>
+            <a:r>
+              <a:rPr lang="en-US" dirty="0" err="1" smtClean="0"/>
+              <a:t>bỏ</a:t>
+            </a:r>
+            <a:r>
+              <a:rPr lang="en-US" dirty="0" smtClean="0"/>
+              <a:t> </a:t>
+            </a:r>
+            <a:r>
+              <a:rPr lang="en-US" dirty="0" err="1" smtClean="0"/>
+              <a:t>rào</a:t>
+            </a:r>
+            <a:r>
+              <a:rPr lang="en-US" dirty="0" smtClean="0"/>
+              <a:t> </a:t>
+            </a:r>
+            <a:r>
+              <a:rPr lang="en-US" dirty="0" err="1" smtClean="0"/>
+              <a:t>cản</a:t>
+            </a:r>
+            <a:r>
+              <a:rPr lang="en-US" dirty="0" smtClean="0"/>
+              <a:t> </a:t>
+            </a:r>
+            <a:r>
+              <a:rPr lang="en-US" dirty="0" err="1" smtClean="0"/>
+              <a:t>các</a:t>
+            </a:r>
+            <a:r>
+              <a:rPr lang="en-US" dirty="0" smtClean="0"/>
+              <a:t> </a:t>
+            </a:r>
+            <a:r>
+              <a:rPr lang="en-US" dirty="0" err="1" smtClean="0"/>
+              <a:t>ứng</a:t>
+            </a:r>
+            <a:r>
+              <a:rPr lang="en-US" dirty="0" smtClean="0"/>
+              <a:t> </a:t>
+            </a:r>
+            <a:r>
+              <a:rPr lang="en-US" dirty="0" err="1" smtClean="0"/>
+              <a:t>dụng</a:t>
+            </a:r>
+            <a:endParaRPr lang="en-US" dirty="0" smtClean="0"/>
+          </a:p>
+          <a:p>
+            <a:r>
+              <a:rPr lang="en-US" dirty="0" err="1" smtClean="0"/>
+              <a:t>Tiết</a:t>
+            </a:r>
+            <a:r>
+              <a:rPr lang="en-US" dirty="0" smtClean="0"/>
+              <a:t> </a:t>
+            </a:r>
+            <a:r>
+              <a:rPr lang="en-US" dirty="0" err="1" smtClean="0"/>
+              <a:t>kiệm</a:t>
+            </a:r>
+            <a:r>
+              <a:rPr lang="en-US" dirty="0" smtClean="0"/>
+              <a:t> </a:t>
+            </a:r>
+            <a:r>
+              <a:rPr lang="en-US" dirty="0" err="1" smtClean="0"/>
+              <a:t>chị</a:t>
+            </a:r>
+            <a:r>
+              <a:rPr lang="en-US" dirty="0" smtClean="0"/>
+              <a:t> </a:t>
+            </a:r>
+            <a:r>
+              <a:rPr lang="en-US" dirty="0" err="1" smtClean="0"/>
+              <a:t>phí</a:t>
             </a:r>
             <a:endParaRPr lang="en-US" dirty="0"/>
           </a:p>
@@ -5673,13 +7086,20 @@
     </p:spTree>
     <p:extLst>
       <p:ext uri="{BB962C8B-B14F-4D97-AF65-F5344CB8AC3E}">
-        <p14:creationId xmlns:p14="http://schemas.microsoft.com/office/powerpoint/2010/main" val="1709627152"/>
+        <p14:creationId xmlns:p14="http://schemas.microsoft.com/office/powerpoint/2010/main" val="3135697864"/>
       </p:ext>
     </p:extLst>
   </p:cSld>
   <p:clrMapOvr>
     <a:masterClrMapping/>
   </p:clrMapOvr>
+  <p:timing>
+    <p:tnLst>
+      <p:par>
+        <p:cTn id="1" dur="indefinite" restart="never" nodeType="tmRoot"/>
+      </p:par>
+    </p:tnLst>
+  </p:timing>
 </p:sld>
 </file>
 

</xml_diff>